<commit_message>
Submission Ready Version of Shiny App
Completed Backend modelling and frontend shiny UI.
</commit_message>
<xml_diff>
--- a/Exchange Rate Application.pptx
+++ b/Exchange Rate Application.pptx
@@ -115,16 +115,32 @@
 </p:presentation>
 </file>
 
-<file path=ppt/revisionInfo.xml><?xml version="1.0" encoding="utf-8"?>
-<p1510:revInfo xmlns:a="http://schemas.openxmlformats.org/drawingml/2006/main" xmlns:r="http://schemas.openxmlformats.org/officeDocument/2006/relationships" xmlns:p1510="http://schemas.microsoft.com/office/powerpoint/2015/10/main">
-  <p1510:revLst>
-    <p1510:client id="{B1183234-40DD-4B27-9335-FC6AD54E1B64}" v="3" dt="2025-05-06T18:26:49.567"/>
-  </p1510:revLst>
-</p1510:revInfo>
-</file>
-
 <file path=ppt/changesInfos/changesInfo1.xml><?xml version="1.0" encoding="utf-8"?>
 <pc:chgInfo xmlns:a="http://schemas.openxmlformats.org/drawingml/2006/main" xmlns:r="http://schemas.openxmlformats.org/officeDocument/2006/relationships" xmlns:ac="http://schemas.microsoft.com/office/drawing/2013/main/command" xmlns:pc="http://schemas.microsoft.com/office/powerpoint/2013/main/command">
+  <pc:docChgLst>
+    <pc:chgData name="Nils Berzins" userId="77cacb0c9cb296b2" providerId="LiveId" clId="{AE3A7C52-4101-497C-9134-A09D1FCE2924}"/>
+    <pc:docChg chg="modSld">
+      <pc:chgData name="Nils Berzins" userId="77cacb0c9cb296b2" providerId="LiveId" clId="{AE3A7C52-4101-497C-9134-A09D1FCE2924}" dt="2025-06-02T21:35:34.145" v="30" actId="20577"/>
+      <pc:docMkLst>
+        <pc:docMk/>
+      </pc:docMkLst>
+      <pc:sldChg chg="modSp mod">
+        <pc:chgData name="Nils Berzins" userId="77cacb0c9cb296b2" providerId="LiveId" clId="{AE3A7C52-4101-497C-9134-A09D1FCE2924}" dt="2025-06-02T21:35:34.145" v="30" actId="20577"/>
+        <pc:sldMkLst>
+          <pc:docMk/>
+          <pc:sldMk cId="2580481065" sldId="256"/>
+        </pc:sldMkLst>
+        <pc:spChg chg="mod">
+          <ac:chgData name="Nils Berzins" userId="77cacb0c9cb296b2" providerId="LiveId" clId="{AE3A7C52-4101-497C-9134-A09D1FCE2924}" dt="2025-06-02T21:35:34.145" v="30" actId="20577"/>
+          <ac:spMkLst>
+            <pc:docMk/>
+            <pc:sldMk cId="2580481065" sldId="256"/>
+            <ac:spMk id="3" creationId="{6B92FFE5-2268-FC2F-A634-B03DC8D6CD45}"/>
+          </ac:spMkLst>
+        </pc:spChg>
+      </pc:sldChg>
+    </pc:docChg>
+  </pc:docChgLst>
   <pc:docChgLst>
     <pc:chgData name="Nils Berzins" userId="77cacb0c9cb296b2" providerId="LiveId" clId="{B1183234-40DD-4B27-9335-FC6AD54E1B64}"/>
     <pc:docChg chg="undo custSel modSld">
@@ -138,14 +154,6 @@
           <pc:docMk/>
           <pc:sldMk cId="4232601327" sldId="257"/>
         </pc:sldMkLst>
-        <pc:spChg chg="del">
-          <ac:chgData name="Nils Berzins" userId="77cacb0c9cb296b2" providerId="LiveId" clId="{B1183234-40DD-4B27-9335-FC6AD54E1B64}" dt="2025-05-06T17:08:38.554" v="0" actId="478"/>
-          <ac:spMkLst>
-            <pc:docMk/>
-            <pc:sldMk cId="4232601327" sldId="257"/>
-            <ac:spMk id="3" creationId="{1C507E4C-5097-0B9A-CFC9-50E405783C79}"/>
-          </ac:spMkLst>
-        </pc:spChg>
         <pc:spChg chg="add mod">
           <ac:chgData name="Nils Berzins" userId="77cacb0c9cb296b2" providerId="LiveId" clId="{B1183234-40DD-4B27-9335-FC6AD54E1B64}" dt="2025-05-06T18:18:32.395" v="1676" actId="5793"/>
           <ac:spMkLst>
@@ -183,14 +191,6 @@
             <pc:docMk/>
             <pc:sldMk cId="3821736867" sldId="258"/>
             <ac:spMk id="3" creationId="{1E7E9B47-42D4-9981-980A-0D6F0F3D70EC}"/>
-          </ac:spMkLst>
-        </pc:spChg>
-        <pc:spChg chg="add del">
-          <ac:chgData name="Nils Berzins" userId="77cacb0c9cb296b2" providerId="LiveId" clId="{B1183234-40DD-4B27-9335-FC6AD54E1B64}" dt="2025-05-06T18:09:22.367" v="1236" actId="26606"/>
-          <ac:spMkLst>
-            <pc:docMk/>
-            <pc:sldMk cId="3821736867" sldId="258"/>
-            <ac:spMk id="14" creationId="{1904B055-668E-876B-88D5-BF2211C5593E}"/>
           </ac:spMkLst>
         </pc:spChg>
         <pc:spChg chg="add">
@@ -240,60 +240,12 @@
             <ac:spMk id="2" creationId="{130A7FC6-ECB7-45C8-D205-0D07C57D242A}"/>
           </ac:spMkLst>
         </pc:spChg>
-        <pc:spChg chg="add del mod">
-          <ac:chgData name="Nils Berzins" userId="77cacb0c9cb296b2" providerId="LiveId" clId="{B1183234-40DD-4B27-9335-FC6AD54E1B64}" dt="2025-05-06T18:25:29.400" v="2332" actId="26606"/>
-          <ac:spMkLst>
-            <pc:docMk/>
-            <pc:sldMk cId="810591715" sldId="259"/>
-            <ac:spMk id="3" creationId="{04BB79EE-14F3-69B4-B75E-C452211DA388}"/>
-          </ac:spMkLst>
-        </pc:spChg>
         <pc:spChg chg="add mod ord">
           <ac:chgData name="Nils Berzins" userId="77cacb0c9cb296b2" providerId="LiveId" clId="{B1183234-40DD-4B27-9335-FC6AD54E1B64}" dt="2025-05-06T18:30:07.232" v="2443" actId="207"/>
           <ac:spMkLst>
             <pc:docMk/>
             <pc:sldMk cId="810591715" sldId="259"/>
             <ac:spMk id="4" creationId="{ECB0BDD7-A227-C890-D70D-FFFAB57A383F}"/>
-          </ac:spMkLst>
-        </pc:spChg>
-        <pc:spChg chg="add del">
-          <ac:chgData name="Nils Berzins" userId="77cacb0c9cb296b2" providerId="LiveId" clId="{B1183234-40DD-4B27-9335-FC6AD54E1B64}" dt="2025-05-06T18:25:03.127" v="2325" actId="26606"/>
-          <ac:spMkLst>
-            <pc:docMk/>
-            <pc:sldMk cId="810591715" sldId="259"/>
-            <ac:spMk id="8" creationId="{DDD1D22E-5996-E45B-92B2-659F701A4A3B}"/>
-          </ac:spMkLst>
-        </pc:spChg>
-        <pc:spChg chg="add del">
-          <ac:chgData name="Nils Berzins" userId="77cacb0c9cb296b2" providerId="LiveId" clId="{B1183234-40DD-4B27-9335-FC6AD54E1B64}" dt="2025-05-06T18:25:04.721" v="2327" actId="26606"/>
-          <ac:spMkLst>
-            <pc:docMk/>
-            <pc:sldMk cId="810591715" sldId="259"/>
-            <ac:spMk id="9" creationId="{353CF00F-82D0-0DBA-75D5-1D01B4526C68}"/>
-          </ac:spMkLst>
-        </pc:spChg>
-        <pc:spChg chg="add del">
-          <ac:chgData name="Nils Berzins" userId="77cacb0c9cb296b2" providerId="LiveId" clId="{B1183234-40DD-4B27-9335-FC6AD54E1B64}" dt="2025-05-06T18:25:22.378" v="2329" actId="26606"/>
-          <ac:spMkLst>
-            <pc:docMk/>
-            <pc:sldMk cId="810591715" sldId="259"/>
-            <ac:spMk id="11" creationId="{DDD1D22E-5996-E45B-92B2-659F701A4A3B}"/>
-          </ac:spMkLst>
-        </pc:spChg>
-        <pc:spChg chg="add del">
-          <ac:chgData name="Nils Berzins" userId="77cacb0c9cb296b2" providerId="LiveId" clId="{B1183234-40DD-4B27-9335-FC6AD54E1B64}" dt="2025-05-06T18:25:22.378" v="2329" actId="26606"/>
-          <ac:spMkLst>
-            <pc:docMk/>
-            <pc:sldMk cId="810591715" sldId="259"/>
-            <ac:spMk id="12" creationId="{04BB79EE-14F3-69B4-B75E-C452211DA388}"/>
-          </ac:spMkLst>
-        </pc:spChg>
-        <pc:spChg chg="add del">
-          <ac:chgData name="Nils Berzins" userId="77cacb0c9cb296b2" providerId="LiveId" clId="{B1183234-40DD-4B27-9335-FC6AD54E1B64}" dt="2025-05-06T18:26:31.465" v="2334" actId="26606"/>
-          <ac:spMkLst>
-            <pc:docMk/>
-            <pc:sldMk cId="810591715" sldId="259"/>
-            <ac:spMk id="16" creationId="{DDD1D22E-5996-E45B-92B2-659F701A4A3B}"/>
           </ac:spMkLst>
         </pc:spChg>
         <pc:spChg chg="add mod ord">
@@ -304,14 +256,6 @@
             <ac:spMk id="17" creationId="{04BB79EE-14F3-69B4-B75E-C452211DA388}"/>
           </ac:spMkLst>
         </pc:spChg>
-        <pc:spChg chg="add del">
-          <ac:chgData name="Nils Berzins" userId="77cacb0c9cb296b2" providerId="LiveId" clId="{B1183234-40DD-4B27-9335-FC6AD54E1B64}" dt="2025-05-06T18:26:51.984" v="2336" actId="26606"/>
-          <ac:spMkLst>
-            <pc:docMk/>
-            <pc:sldMk cId="810591715" sldId="259"/>
-            <ac:spMk id="1031" creationId="{C20CE451-818C-E63D-258B-234B6C543D34}"/>
-          </ac:spMkLst>
-        </pc:spChg>
         <pc:spChg chg="add">
           <ac:chgData name="Nils Berzins" userId="77cacb0c9cb296b2" providerId="LiveId" clId="{B1183234-40DD-4B27-9335-FC6AD54E1B64}" dt="2025-05-06T18:26:51.984" v="2336" actId="26606"/>
           <ac:spMkLst>
@@ -320,30 +264,6 @@
             <ac:spMk id="1037" creationId="{BA2AFC67-0973-EC0D-F14E-710D701B20BD}"/>
           </ac:spMkLst>
         </pc:spChg>
-        <pc:graphicFrameChg chg="add del">
-          <ac:chgData name="Nils Berzins" userId="77cacb0c9cb296b2" providerId="LiveId" clId="{B1183234-40DD-4B27-9335-FC6AD54E1B64}" dt="2025-05-06T18:25:04.721" v="2327" actId="26606"/>
-          <ac:graphicFrameMkLst>
-            <pc:docMk/>
-            <pc:sldMk cId="810591715" sldId="259"/>
-            <ac:graphicFrameMk id="5" creationId="{2D556BD1-58C1-BCFD-A5ED-B66BD286472E}"/>
-          </ac:graphicFrameMkLst>
-        </pc:graphicFrameChg>
-        <pc:graphicFrameChg chg="add del">
-          <ac:chgData name="Nils Berzins" userId="77cacb0c9cb296b2" providerId="LiveId" clId="{B1183234-40DD-4B27-9335-FC6AD54E1B64}" dt="2025-05-06T18:25:29.396" v="2331" actId="26606"/>
-          <ac:graphicFrameMkLst>
-            <pc:docMk/>
-            <pc:sldMk cId="810591715" sldId="259"/>
-            <ac:graphicFrameMk id="14" creationId="{D07B0028-09E2-7A84-A3FE-FBAB92AC91F2}"/>
-          </ac:graphicFrameMkLst>
-        </pc:graphicFrameChg>
-        <pc:picChg chg="add del mod">
-          <ac:chgData name="Nils Berzins" userId="77cacb0c9cb296b2" providerId="LiveId" clId="{B1183234-40DD-4B27-9335-FC6AD54E1B64}" dt="2025-05-06T18:26:49.567" v="2335" actId="478"/>
-          <ac:picMkLst>
-            <pc:docMk/>
-            <pc:sldMk cId="810591715" sldId="259"/>
-            <ac:picMk id="1026" creationId="{AF85FBA5-31D9-0BC7-A4D1-2BCBAE8CF357}"/>
-          </ac:picMkLst>
-        </pc:picChg>
         <pc:picChg chg="add mod ord">
           <ac:chgData name="Nils Berzins" userId="77cacb0c9cb296b2" providerId="LiveId" clId="{B1183234-40DD-4B27-9335-FC6AD54E1B64}" dt="2025-05-06T18:27:53.292" v="2349" actId="14100"/>
           <ac:picMkLst>
@@ -511,7 +431,7 @@
           <a:p>
             <a:fld id="{C128FA71-3A18-48C0-980F-4B68F7F63042}" type="datetime1">
               <a:rPr lang="en-US" smtClean="0"/>
-              <a:t>5/6/2025</a:t>
+              <a:t>6/2/2025</a:t>
             </a:fld>
             <a:endParaRPr lang="en-US"/>
           </a:p>
@@ -719,7 +639,7 @@
           <a:p>
             <a:fld id="{7104EDB3-C0E8-45F8-9E1D-1B6C8D1880C0}" type="datetime1">
               <a:rPr lang="en-US" smtClean="0"/>
-              <a:t>5/6/2025</a:t>
+              <a:t>6/2/2025</a:t>
             </a:fld>
             <a:endParaRPr lang="en-US"/>
           </a:p>
@@ -929,7 +849,7 @@
           <a:p>
             <a:fld id="{9CF0EC4B-54ED-4041-B552-9BA760FA3DBA}" type="datetime1">
               <a:rPr lang="en-US" smtClean="0"/>
-              <a:t>5/6/2025</a:t>
+              <a:t>6/2/2025</a:t>
             </a:fld>
             <a:endParaRPr lang="en-US"/>
           </a:p>
@@ -1127,7 +1047,7 @@
           <a:p>
             <a:fld id="{51C1210E-201E-4473-82AC-2466F5386C38}" type="datetime1">
               <a:rPr lang="en-US" smtClean="0"/>
-              <a:t>5/6/2025</a:t>
+              <a:t>6/2/2025</a:t>
             </a:fld>
             <a:endParaRPr lang="en-US"/>
           </a:p>
@@ -1405,7 +1325,7 @@
           <a:p>
             <a:fld id="{B01EA198-6CAB-4B8F-B93F-1F9C8C4B6CE7}" type="datetime1">
               <a:rPr lang="en-US" smtClean="0"/>
-              <a:t>5/6/2025</a:t>
+              <a:t>6/2/2025</a:t>
             </a:fld>
             <a:endParaRPr lang="en-US"/>
           </a:p>
@@ -1677,7 +1597,7 @@
           <a:p>
             <a:fld id="{CA06041F-4525-44D5-AA4F-332294BF1F56}" type="datetime1">
               <a:rPr lang="en-US" smtClean="0"/>
-              <a:t>5/6/2025</a:t>
+              <a:t>6/2/2025</a:t>
             </a:fld>
             <a:endParaRPr lang="en-US"/>
           </a:p>
@@ -2101,7 +2021,7 @@
           <a:p>
             <a:fld id="{F9557091-BBDF-4EB9-BA6B-2BB67AC4FC0F}" type="datetime1">
               <a:rPr lang="en-US" smtClean="0"/>
-              <a:t>5/6/2025</a:t>
+              <a:t>6/2/2025</a:t>
             </a:fld>
             <a:endParaRPr lang="en-US"/>
           </a:p>
@@ -2242,7 +2162,7 @@
           <a:p>
             <a:fld id="{2D6B226B-77A6-410C-9796-083F278E0125}" type="datetime1">
               <a:rPr lang="en-US" smtClean="0"/>
-              <a:t>5/6/2025</a:t>
+              <a:t>6/2/2025</a:t>
             </a:fld>
             <a:endParaRPr lang="en-US"/>
           </a:p>
@@ -2355,7 +2275,7 @@
           <a:p>
             <a:fld id="{A23A578B-D289-4C40-8593-3D356C49DA58}" type="datetime1">
               <a:rPr lang="en-US" smtClean="0"/>
-              <a:t>5/6/2025</a:t>
+              <a:t>6/2/2025</a:t>
             </a:fld>
             <a:endParaRPr lang="en-US"/>
           </a:p>
@@ -2674,7 +2594,7 @@
           <a:p>
             <a:fld id="{713DFAE3-14DB-48A7-A80F-80DDB072CE3D}" type="datetime1">
               <a:rPr lang="en-US" smtClean="0"/>
-              <a:t>5/6/2025</a:t>
+              <a:t>6/2/2025</a:t>
             </a:fld>
             <a:endParaRPr lang="en-US"/>
           </a:p>
@@ -2968,7 +2888,7 @@
           <a:p>
             <a:fld id="{92C5EAEF-6478-4102-8F5D-A5FE9FC97ACB}" type="datetime1">
               <a:rPr lang="en-US" smtClean="0"/>
-              <a:t>5/6/2025</a:t>
+              <a:t>6/2/2025</a:t>
             </a:fld>
             <a:endParaRPr lang="en-US"/>
           </a:p>
@@ -3209,7 +3129,7 @@
           <a:p>
             <a:fld id="{67F45AC6-C491-4585-A584-9CE2AF7D5500}" type="datetime1">
               <a:rPr lang="en-US" smtClean="0"/>
-              <a:t>5/6/2025</a:t>
+              <a:t>6/2/2025</a:t>
             </a:fld>
             <a:endParaRPr lang="en-US"/>
           </a:p>
@@ -3949,7 +3869,7 @@
             <a:pPr algn="l"/>
             <a:r>
               <a:rPr lang="en-US" sz="2200" dirty="0"/>
-              <a:t>Project Proposal by Nils Berzins</a:t>
+              <a:t>Final Project by Nils Berzins</a:t>
             </a:r>
           </a:p>
         </p:txBody>

</xml_diff>

<commit_message>
Adding project write up and small edits to Data Collection Notebook
</commit_message>
<xml_diff>
--- a/Exchange Rate Application.pptx
+++ b/Exchange Rate Application.pptx
@@ -9,6 +9,7 @@
     <p:sldId id="257" r:id="rId3"/>
     <p:sldId id="258" r:id="rId4"/>
     <p:sldId id="259" r:id="rId5"/>
+    <p:sldId id="260" r:id="rId6"/>
   </p:sldIdLst>
   <p:sldSz cx="12192000" cy="6858000"/>
   <p:notesSz cx="6858000" cy="9144000"/>
@@ -115,17 +116,25 @@
 </p:presentation>
 </file>
 
+<file path=ppt/revisionInfo.xml><?xml version="1.0" encoding="utf-8"?>
+<p1510:revInfo xmlns:a="http://schemas.openxmlformats.org/drawingml/2006/main" xmlns:r="http://schemas.openxmlformats.org/officeDocument/2006/relationships" xmlns:p1510="http://schemas.microsoft.com/office/powerpoint/2015/10/main">
+  <p1510:revLst>
+    <p1510:client id="{AE3A7C52-4101-497C-9134-A09D1FCE2924}" v="9" dt="2025-06-03T01:51:00.541"/>
+  </p1510:revLst>
+</p1510:revInfo>
+</file>
+
 <file path=ppt/changesInfos/changesInfo1.xml><?xml version="1.0" encoding="utf-8"?>
 <pc:chgInfo xmlns:a="http://schemas.openxmlformats.org/drawingml/2006/main" xmlns:r="http://schemas.openxmlformats.org/officeDocument/2006/relationships" xmlns:ac="http://schemas.microsoft.com/office/drawing/2013/main/command" xmlns:pc="http://schemas.microsoft.com/office/powerpoint/2013/main/command">
   <pc:docChgLst>
     <pc:chgData name="Nils Berzins" userId="77cacb0c9cb296b2" providerId="LiveId" clId="{AE3A7C52-4101-497C-9134-A09D1FCE2924}"/>
-    <pc:docChg chg="modSld">
-      <pc:chgData name="Nils Berzins" userId="77cacb0c9cb296b2" providerId="LiveId" clId="{AE3A7C52-4101-497C-9134-A09D1FCE2924}" dt="2025-06-02T21:35:34.145" v="30" actId="20577"/>
+    <pc:docChg chg="undo custSel addSld delSld modSld sldOrd">
+      <pc:chgData name="Nils Berzins" userId="77cacb0c9cb296b2" providerId="LiveId" clId="{AE3A7C52-4101-497C-9134-A09D1FCE2924}" dt="2025-06-03T02:43:33.023" v="3383" actId="20577"/>
       <pc:docMkLst>
         <pc:docMk/>
       </pc:docMkLst>
       <pc:sldChg chg="modSp mod">
-        <pc:chgData name="Nils Berzins" userId="77cacb0c9cb296b2" providerId="LiveId" clId="{AE3A7C52-4101-497C-9134-A09D1FCE2924}" dt="2025-06-02T21:35:34.145" v="30" actId="20577"/>
+        <pc:chgData name="Nils Berzins" userId="77cacb0c9cb296b2" providerId="LiveId" clId="{AE3A7C52-4101-497C-9134-A09D1FCE2924}" dt="2025-06-03T00:39:50.897" v="32" actId="1076"/>
         <pc:sldMkLst>
           <pc:docMk/>
           <pc:sldMk cId="2580481065" sldId="256"/>
@@ -136,6 +145,441 @@
             <pc:docMk/>
             <pc:sldMk cId="2580481065" sldId="256"/>
             <ac:spMk id="3" creationId="{6B92FFE5-2268-FC2F-A634-B03DC8D6CD45}"/>
+          </ac:spMkLst>
+        </pc:spChg>
+        <pc:picChg chg="mod">
+          <ac:chgData name="Nils Berzins" userId="77cacb0c9cb296b2" providerId="LiveId" clId="{AE3A7C52-4101-497C-9134-A09D1FCE2924}" dt="2025-06-03T00:39:50.897" v="32" actId="1076"/>
+          <ac:picMkLst>
+            <pc:docMk/>
+            <pc:sldMk cId="2580481065" sldId="256"/>
+            <ac:picMk id="14" creationId="{6DE68B59-B054-58E0-7210-229AFB3FEF0B}"/>
+          </ac:picMkLst>
+        </pc:picChg>
+      </pc:sldChg>
+      <pc:sldChg chg="addSp delSp modSp mod setBg addAnim modAnim setClrOvrMap">
+        <pc:chgData name="Nils Berzins" userId="77cacb0c9cb296b2" providerId="LiveId" clId="{AE3A7C52-4101-497C-9134-A09D1FCE2924}" dt="2025-06-03T00:41:36.926" v="109" actId="14100"/>
+        <pc:sldMkLst>
+          <pc:docMk/>
+          <pc:sldMk cId="4232601327" sldId="257"/>
+        </pc:sldMkLst>
+        <pc:spChg chg="mod ord">
+          <ac:chgData name="Nils Berzins" userId="77cacb0c9cb296b2" providerId="LiveId" clId="{AE3A7C52-4101-497C-9134-A09D1FCE2924}" dt="2025-06-03T00:41:08.361" v="105" actId="962"/>
+          <ac:spMkLst>
+            <pc:docMk/>
+            <pc:sldMk cId="4232601327" sldId="257"/>
+            <ac:spMk id="2" creationId="{65617827-B9C1-33F1-BEBF-523DE574147A}"/>
+          </ac:spMkLst>
+        </pc:spChg>
+        <pc:spChg chg="del mod">
+          <ac:chgData name="Nils Berzins" userId="77cacb0c9cb296b2" providerId="LiveId" clId="{AE3A7C52-4101-497C-9134-A09D1FCE2924}" dt="2025-06-03T00:40:09.859" v="92" actId="478"/>
+          <ac:spMkLst>
+            <pc:docMk/>
+            <pc:sldMk cId="4232601327" sldId="257"/>
+            <ac:spMk id="6" creationId="{DE6E109B-91E7-DDAF-A7B2-A879DB699CB1}"/>
+          </ac:spMkLst>
+        </pc:spChg>
+        <pc:spChg chg="add">
+          <ac:chgData name="Nils Berzins" userId="77cacb0c9cb296b2" providerId="LiveId" clId="{AE3A7C52-4101-497C-9134-A09D1FCE2924}" dt="2025-06-03T00:40:58.364" v="101" actId="26606"/>
+          <ac:spMkLst>
+            <pc:docMk/>
+            <pc:sldMk cId="4232601327" sldId="257"/>
+            <ac:spMk id="9" creationId="{0EECA69B-4C2A-7F31-8019-E90DB3BD49CB}"/>
+          </ac:spMkLst>
+        </pc:spChg>
+        <pc:spChg chg="add">
+          <ac:chgData name="Nils Berzins" userId="77cacb0c9cb296b2" providerId="LiveId" clId="{AE3A7C52-4101-497C-9134-A09D1FCE2924}" dt="2025-06-03T00:40:58.364" v="101" actId="26606"/>
+          <ac:spMkLst>
+            <pc:docMk/>
+            <pc:sldMk cId="4232601327" sldId="257"/>
+            <ac:spMk id="11" creationId="{495DEB6A-976D-98B6-8875-F4C240958B3E}"/>
+          </ac:spMkLst>
+        </pc:spChg>
+        <pc:picChg chg="add mod modCrop">
+          <ac:chgData name="Nils Berzins" userId="77cacb0c9cb296b2" providerId="LiveId" clId="{AE3A7C52-4101-497C-9134-A09D1FCE2924}" dt="2025-06-03T00:41:36.926" v="109" actId="14100"/>
+          <ac:picMkLst>
+            <pc:docMk/>
+            <pc:sldMk cId="4232601327" sldId="257"/>
+            <ac:picMk id="4" creationId="{696080BF-94B2-0A95-D2E0-7AA318B6587A}"/>
+          </ac:picMkLst>
+        </pc:picChg>
+        <pc:picChg chg="del">
+          <ac:chgData name="Nils Berzins" userId="77cacb0c9cb296b2" providerId="LiveId" clId="{AE3A7C52-4101-497C-9134-A09D1FCE2924}" dt="2025-06-03T00:40:05.537" v="89" actId="478"/>
+          <ac:picMkLst>
+            <pc:docMk/>
+            <pc:sldMk cId="4232601327" sldId="257"/>
+            <ac:picMk id="5" creationId="{E87B34DD-CFD1-8080-9B5A-CA2128E59F5D}"/>
+          </ac:picMkLst>
+        </pc:picChg>
+      </pc:sldChg>
+      <pc:sldChg chg="addSp delSp modSp mod addAnim delAnim setClrOvrMap">
+        <pc:chgData name="Nils Berzins" userId="77cacb0c9cb296b2" providerId="LiveId" clId="{AE3A7C52-4101-497C-9134-A09D1FCE2924}" dt="2025-06-03T01:54:16.598" v="1147" actId="14100"/>
+        <pc:sldMkLst>
+          <pc:docMk/>
+          <pc:sldMk cId="3821736867" sldId="258"/>
+        </pc:sldMkLst>
+        <pc:spChg chg="mod ord">
+          <ac:chgData name="Nils Berzins" userId="77cacb0c9cb296b2" providerId="LiveId" clId="{AE3A7C52-4101-497C-9134-A09D1FCE2924}" dt="2025-06-03T01:50:48.391" v="1035" actId="1035"/>
+          <ac:spMkLst>
+            <pc:docMk/>
+            <pc:sldMk cId="3821736867" sldId="258"/>
+            <ac:spMk id="2" creationId="{7B7FA702-CC80-2A76-114B-ADCD3C6ACB2D}"/>
+          </ac:spMkLst>
+        </pc:spChg>
+        <pc:spChg chg="del">
+          <ac:chgData name="Nils Berzins" userId="77cacb0c9cb296b2" providerId="LiveId" clId="{AE3A7C52-4101-497C-9134-A09D1FCE2924}" dt="2025-06-03T01:00:58.772" v="110" actId="478"/>
+          <ac:spMkLst>
+            <pc:docMk/>
+            <pc:sldMk cId="3821736867" sldId="258"/>
+            <ac:spMk id="3" creationId="{1E7E9B47-42D4-9981-980A-0D6F0F3D70EC}"/>
+          </ac:spMkLst>
+        </pc:spChg>
+        <pc:spChg chg="add del mod">
+          <ac:chgData name="Nils Berzins" userId="77cacb0c9cb296b2" providerId="LiveId" clId="{AE3A7C52-4101-497C-9134-A09D1FCE2924}" dt="2025-06-03T01:40:36.754" v="162" actId="478"/>
+          <ac:spMkLst>
+            <pc:docMk/>
+            <pc:sldMk cId="3821736867" sldId="258"/>
+            <ac:spMk id="6" creationId="{4E142B03-0C75-47FB-9E56-0173CFE435CC}"/>
+          </ac:spMkLst>
+        </pc:spChg>
+        <pc:spChg chg="add mod">
+          <ac:chgData name="Nils Berzins" userId="77cacb0c9cb296b2" providerId="LiveId" clId="{AE3A7C52-4101-497C-9134-A09D1FCE2924}" dt="2025-06-03T01:50:56.856" v="1067" actId="1035"/>
+          <ac:spMkLst>
+            <pc:docMk/>
+            <pc:sldMk cId="3821736867" sldId="258"/>
+            <ac:spMk id="11" creationId="{6384D3D7-4DDF-1FD5-0722-FB3999407A1C}"/>
+          </ac:spMkLst>
+        </pc:spChg>
+        <pc:spChg chg="add mod">
+          <ac:chgData name="Nils Berzins" userId="77cacb0c9cb296b2" providerId="LiveId" clId="{AE3A7C52-4101-497C-9134-A09D1FCE2924}" dt="2025-06-03T01:53:57.895" v="1144" actId="1076"/>
+          <ac:spMkLst>
+            <pc:docMk/>
+            <pc:sldMk cId="3821736867" sldId="258"/>
+            <ac:spMk id="16" creationId="{79E98074-FD12-65DE-805E-553EC2FE3D58}"/>
+          </ac:spMkLst>
+        </pc:spChg>
+        <pc:spChg chg="add del">
+          <ac:chgData name="Nils Berzins" userId="77cacb0c9cb296b2" providerId="LiveId" clId="{AE3A7C52-4101-497C-9134-A09D1FCE2924}" dt="2025-06-03T01:41:10.067" v="184" actId="26606"/>
+          <ac:spMkLst>
+            <pc:docMk/>
+            <pc:sldMk cId="3821736867" sldId="258"/>
+            <ac:spMk id="19" creationId="{2C5AECB1-8254-3357-3EB3-6A75DA093109}"/>
+          </ac:spMkLst>
+        </pc:spChg>
+        <pc:spChg chg="add mod">
+          <ac:chgData name="Nils Berzins" userId="77cacb0c9cb296b2" providerId="LiveId" clId="{AE3A7C52-4101-497C-9134-A09D1FCE2924}" dt="2025-06-03T01:54:13.877" v="1146" actId="1076"/>
+          <ac:spMkLst>
+            <pc:docMk/>
+            <pc:sldMk cId="3821736867" sldId="258"/>
+            <ac:spMk id="21" creationId="{E53EF171-584E-F2F1-18C3-DD316D726921}"/>
+          </ac:spMkLst>
+        </pc:spChg>
+        <pc:spChg chg="add del">
+          <ac:chgData name="Nils Berzins" userId="77cacb0c9cb296b2" providerId="LiveId" clId="{AE3A7C52-4101-497C-9134-A09D1FCE2924}" dt="2025-06-03T01:40:47.064" v="165" actId="26606"/>
+          <ac:spMkLst>
+            <pc:docMk/>
+            <pc:sldMk cId="3821736867" sldId="258"/>
+            <ac:spMk id="24" creationId="{80B98925-0550-1AFB-C1DC-02792400FB71}"/>
+          </ac:spMkLst>
+        </pc:spChg>
+        <pc:spChg chg="add mod">
+          <ac:chgData name="Nils Berzins" userId="77cacb0c9cb296b2" providerId="LiveId" clId="{AE3A7C52-4101-497C-9134-A09D1FCE2924}" dt="2025-06-03T01:50:56.856" v="1067" actId="1035"/>
+          <ac:spMkLst>
+            <pc:docMk/>
+            <pc:sldMk cId="3821736867" sldId="258"/>
+            <ac:spMk id="25" creationId="{B8E59C4B-A6ED-A2E2-F865-FA35C9C5BD58}"/>
+          </ac:spMkLst>
+        </pc:spChg>
+        <pc:spChg chg="add del">
+          <ac:chgData name="Nils Berzins" userId="77cacb0c9cb296b2" providerId="LiveId" clId="{AE3A7C52-4101-497C-9134-A09D1FCE2924}" dt="2025-06-03T01:40:47.064" v="165" actId="26606"/>
+          <ac:spMkLst>
+            <pc:docMk/>
+            <pc:sldMk cId="3821736867" sldId="258"/>
+            <ac:spMk id="26" creationId="{0CCA9273-E74E-A306-1F74-BEF9EDA30500}"/>
+          </ac:spMkLst>
+        </pc:spChg>
+        <pc:spChg chg="add mod">
+          <ac:chgData name="Nils Berzins" userId="77cacb0c9cb296b2" providerId="LiveId" clId="{AE3A7C52-4101-497C-9134-A09D1FCE2924}" dt="2025-06-03T01:53:44.824" v="1141" actId="20577"/>
+          <ac:spMkLst>
+            <pc:docMk/>
+            <pc:sldMk cId="3821736867" sldId="258"/>
+            <ac:spMk id="27" creationId="{37CF974D-A469-C262-D949-90122D07B83F}"/>
+          </ac:spMkLst>
+        </pc:spChg>
+        <pc:spChg chg="add del">
+          <ac:chgData name="Nils Berzins" userId="77cacb0c9cb296b2" providerId="LiveId" clId="{AE3A7C52-4101-497C-9134-A09D1FCE2924}" dt="2025-06-03T01:40:49.693" v="168" actId="26606"/>
+          <ac:spMkLst>
+            <pc:docMk/>
+            <pc:sldMk cId="3821736867" sldId="258"/>
+            <ac:spMk id="28" creationId="{ED587E41-605C-A8E4-8BA5-0E0B3797C9AA}"/>
+          </ac:spMkLst>
+        </pc:spChg>
+        <pc:spChg chg="add del">
+          <ac:chgData name="Nils Berzins" userId="77cacb0c9cb296b2" providerId="LiveId" clId="{AE3A7C52-4101-497C-9134-A09D1FCE2924}" dt="2025-06-03T01:40:49.693" v="168" actId="26606"/>
+          <ac:spMkLst>
+            <pc:docMk/>
+            <pc:sldMk cId="3821736867" sldId="258"/>
+            <ac:spMk id="29" creationId="{EBD48A03-0DF9-3063-CB15-1BC2AEC79F1C}"/>
+          </ac:spMkLst>
+        </pc:spChg>
+        <pc:spChg chg="add del">
+          <ac:chgData name="Nils Berzins" userId="77cacb0c9cb296b2" providerId="LiveId" clId="{AE3A7C52-4101-497C-9134-A09D1FCE2924}" dt="2025-06-03T01:40:57.907" v="171" actId="26606"/>
+          <ac:spMkLst>
+            <pc:docMk/>
+            <pc:sldMk cId="3821736867" sldId="258"/>
+            <ac:spMk id="31" creationId="{0EECA69B-4C2A-7F31-8019-E90DB3BD49CB}"/>
+          </ac:spMkLst>
+        </pc:spChg>
+        <pc:spChg chg="add del">
+          <ac:chgData name="Nils Berzins" userId="77cacb0c9cb296b2" providerId="LiveId" clId="{AE3A7C52-4101-497C-9134-A09D1FCE2924}" dt="2025-06-03T01:40:57.907" v="171" actId="26606"/>
+          <ac:spMkLst>
+            <pc:docMk/>
+            <pc:sldMk cId="3821736867" sldId="258"/>
+            <ac:spMk id="32" creationId="{495DEB6A-976D-98B6-8875-F4C240958B3E}"/>
+          </ac:spMkLst>
+        </pc:spChg>
+        <pc:spChg chg="add del">
+          <ac:chgData name="Nils Berzins" userId="77cacb0c9cb296b2" providerId="LiveId" clId="{AE3A7C52-4101-497C-9134-A09D1FCE2924}" dt="2025-06-03T01:40:59.454" v="173" actId="26606"/>
+          <ac:spMkLst>
+            <pc:docMk/>
+            <pc:sldMk cId="3821736867" sldId="258"/>
+            <ac:spMk id="34" creationId="{01187F7A-920C-B377-65E8-1CF4CBCE3C2C}"/>
+          </ac:spMkLst>
+        </pc:spChg>
+        <pc:spChg chg="add mod">
+          <ac:chgData name="Nils Berzins" userId="77cacb0c9cb296b2" providerId="LiveId" clId="{AE3A7C52-4101-497C-9134-A09D1FCE2924}" dt="2025-06-03T01:51:31.011" v="1129" actId="207"/>
+          <ac:spMkLst>
+            <pc:docMk/>
+            <pc:sldMk cId="3821736867" sldId="258"/>
+            <ac:spMk id="35" creationId="{2AF6813F-8AA0-E42B-A6BE-7AA5E7E0BAA2}"/>
+          </ac:spMkLst>
+        </pc:spChg>
+        <pc:spChg chg="add del">
+          <ac:chgData name="Nils Berzins" userId="77cacb0c9cb296b2" providerId="LiveId" clId="{AE3A7C52-4101-497C-9134-A09D1FCE2924}" dt="2025-06-03T01:41:02.671" v="175" actId="26606"/>
+          <ac:spMkLst>
+            <pc:docMk/>
+            <pc:sldMk cId="3821736867" sldId="258"/>
+            <ac:spMk id="36" creationId="{14D27876-614E-CCD5-5142-A650DBF0B099}"/>
+          </ac:spMkLst>
+        </pc:spChg>
+        <pc:spChg chg="add del">
+          <ac:chgData name="Nils Berzins" userId="77cacb0c9cb296b2" providerId="LiveId" clId="{AE3A7C52-4101-497C-9134-A09D1FCE2924}" dt="2025-06-03T01:41:04.054" v="178" actId="26606"/>
+          <ac:spMkLst>
+            <pc:docMk/>
+            <pc:sldMk cId="3821736867" sldId="258"/>
+            <ac:spMk id="38" creationId="{ED587E41-605C-A8E4-8BA5-0E0B3797C9AA}"/>
+          </ac:spMkLst>
+        </pc:spChg>
+        <pc:spChg chg="add del">
+          <ac:chgData name="Nils Berzins" userId="77cacb0c9cb296b2" providerId="LiveId" clId="{AE3A7C52-4101-497C-9134-A09D1FCE2924}" dt="2025-06-03T01:41:04.054" v="178" actId="26606"/>
+          <ac:spMkLst>
+            <pc:docMk/>
+            <pc:sldMk cId="3821736867" sldId="258"/>
+            <ac:spMk id="39" creationId="{EBD48A03-0DF9-3063-CB15-1BC2AEC79F1C}"/>
+          </ac:spMkLst>
+        </pc:spChg>
+        <pc:spChg chg="add del">
+          <ac:chgData name="Nils Berzins" userId="77cacb0c9cb296b2" providerId="LiveId" clId="{AE3A7C52-4101-497C-9134-A09D1FCE2924}" dt="2025-06-03T01:41:08.579" v="181" actId="26606"/>
+          <ac:spMkLst>
+            <pc:docMk/>
+            <pc:sldMk cId="3821736867" sldId="258"/>
+            <ac:spMk id="41" creationId="{0EECA69B-4C2A-7F31-8019-E90DB3BD49CB}"/>
+          </ac:spMkLst>
+        </pc:spChg>
+        <pc:spChg chg="add del">
+          <ac:chgData name="Nils Berzins" userId="77cacb0c9cb296b2" providerId="LiveId" clId="{AE3A7C52-4101-497C-9134-A09D1FCE2924}" dt="2025-06-03T01:41:08.579" v="181" actId="26606"/>
+          <ac:spMkLst>
+            <pc:docMk/>
+            <pc:sldMk cId="3821736867" sldId="258"/>
+            <ac:spMk id="42" creationId="{495DEB6A-976D-98B6-8875-F4C240958B3E}"/>
+          </ac:spMkLst>
+        </pc:spChg>
+        <pc:spChg chg="add del">
+          <ac:chgData name="Nils Berzins" userId="77cacb0c9cb296b2" providerId="LiveId" clId="{AE3A7C52-4101-497C-9134-A09D1FCE2924}" dt="2025-06-03T01:41:10.063" v="183" actId="26606"/>
+          <ac:spMkLst>
+            <pc:docMk/>
+            <pc:sldMk cId="3821736867" sldId="258"/>
+            <ac:spMk id="44" creationId="{ED587E41-605C-A8E4-8BA5-0E0B3797C9AA}"/>
+          </ac:spMkLst>
+        </pc:spChg>
+        <pc:spChg chg="add del">
+          <ac:chgData name="Nils Berzins" userId="77cacb0c9cb296b2" providerId="LiveId" clId="{AE3A7C52-4101-497C-9134-A09D1FCE2924}" dt="2025-06-03T01:41:10.063" v="183" actId="26606"/>
+          <ac:spMkLst>
+            <pc:docMk/>
+            <pc:sldMk cId="3821736867" sldId="258"/>
+            <ac:spMk id="45" creationId="{EBD48A03-0DF9-3063-CB15-1BC2AEC79F1C}"/>
+          </ac:spMkLst>
+        </pc:spChg>
+        <pc:spChg chg="add del">
+          <ac:chgData name="Nils Berzins" userId="77cacb0c9cb296b2" providerId="LiveId" clId="{AE3A7C52-4101-497C-9134-A09D1FCE2924}" dt="2025-06-03T01:41:24.193" v="187" actId="26606"/>
+          <ac:spMkLst>
+            <pc:docMk/>
+            <pc:sldMk cId="3821736867" sldId="258"/>
+            <ac:spMk id="47" creationId="{ED587E41-605C-A8E4-8BA5-0E0B3797C9AA}"/>
+          </ac:spMkLst>
+        </pc:spChg>
+        <pc:spChg chg="add del">
+          <ac:chgData name="Nils Berzins" userId="77cacb0c9cb296b2" providerId="LiveId" clId="{AE3A7C52-4101-497C-9134-A09D1FCE2924}" dt="2025-06-03T01:41:24.193" v="187" actId="26606"/>
+          <ac:spMkLst>
+            <pc:docMk/>
+            <pc:sldMk cId="3821736867" sldId="258"/>
+            <ac:spMk id="48" creationId="{EBD48A03-0DF9-3063-CB15-1BC2AEC79F1C}"/>
+          </ac:spMkLst>
+        </pc:spChg>
+        <pc:spChg chg="add del">
+          <ac:chgData name="Nils Berzins" userId="77cacb0c9cb296b2" providerId="LiveId" clId="{AE3A7C52-4101-497C-9134-A09D1FCE2924}" dt="2025-06-03T01:41:24.190" v="186" actId="26606"/>
+          <ac:spMkLst>
+            <pc:docMk/>
+            <pc:sldMk cId="3821736867" sldId="258"/>
+            <ac:spMk id="53" creationId="{01187F7A-920C-B377-65E8-1CF4CBCE3C2C}"/>
+          </ac:spMkLst>
+        </pc:spChg>
+        <pc:spChg chg="add">
+          <ac:chgData name="Nils Berzins" userId="77cacb0c9cb296b2" providerId="LiveId" clId="{AE3A7C52-4101-497C-9134-A09D1FCE2924}" dt="2025-06-03T01:41:24.193" v="187" actId="26606"/>
+          <ac:spMkLst>
+            <pc:docMk/>
+            <pc:sldMk cId="3821736867" sldId="258"/>
+            <ac:spMk id="55" creationId="{9B65F7F7-2FCE-8F01-53DE-15C39342BE99}"/>
+          </ac:spMkLst>
+        </pc:spChg>
+        <pc:picChg chg="del">
+          <ac:chgData name="Nils Berzins" userId="77cacb0c9cb296b2" providerId="LiveId" clId="{AE3A7C52-4101-497C-9134-A09D1FCE2924}" dt="2025-06-03T01:01:00.204" v="111" actId="478"/>
+          <ac:picMkLst>
+            <pc:docMk/>
+            <pc:sldMk cId="3821736867" sldId="258"/>
+            <ac:picMk id="5" creationId="{B51DC1DD-0207-8F93-041D-BBE3C530241C}"/>
+          </ac:picMkLst>
+        </pc:picChg>
+        <pc:picChg chg="del">
+          <ac:chgData name="Nils Berzins" userId="77cacb0c9cb296b2" providerId="LiveId" clId="{AE3A7C52-4101-497C-9134-A09D1FCE2924}" dt="2025-06-03T01:01:03.772" v="112" actId="478"/>
+          <ac:picMkLst>
+            <pc:docMk/>
+            <pc:sldMk cId="3821736867" sldId="258"/>
+            <ac:picMk id="7" creationId="{737C2DB5-0AB6-ED31-15C7-6167FA55F737}"/>
+          </ac:picMkLst>
+        </pc:picChg>
+        <pc:picChg chg="del">
+          <ac:chgData name="Nils Berzins" userId="77cacb0c9cb296b2" providerId="LiveId" clId="{AE3A7C52-4101-497C-9134-A09D1FCE2924}" dt="2025-06-03T01:01:06.511" v="113" actId="478"/>
+          <ac:picMkLst>
+            <pc:docMk/>
+            <pc:sldMk cId="3821736867" sldId="258"/>
+            <ac:picMk id="9" creationId="{B77CABA6-DD8F-6FA7-A3F4-E91938C8CD52}"/>
+          </ac:picMkLst>
+        </pc:picChg>
+        <pc:picChg chg="add mod ord modCrop">
+          <ac:chgData name="Nils Berzins" userId="77cacb0c9cb296b2" providerId="LiveId" clId="{AE3A7C52-4101-497C-9134-A09D1FCE2924}" dt="2025-06-03T01:53:54.942" v="1143" actId="1076"/>
+          <ac:picMkLst>
+            <pc:docMk/>
+            <pc:sldMk cId="3821736867" sldId="258"/>
+            <ac:picMk id="10" creationId="{2E942D24-7F0A-30A7-264F-9D9B35310E61}"/>
+          </ac:picMkLst>
+        </pc:picChg>
+        <pc:cxnChg chg="add mod">
+          <ac:chgData name="Nils Berzins" userId="77cacb0c9cb296b2" providerId="LiveId" clId="{AE3A7C52-4101-497C-9134-A09D1FCE2924}" dt="2025-06-03T01:50:56.856" v="1067" actId="1035"/>
+          <ac:cxnSpMkLst>
+            <pc:docMk/>
+            <pc:sldMk cId="3821736867" sldId="258"/>
+            <ac:cxnSpMk id="13" creationId="{7AE4822A-9C56-D0D7-8EB8-573F83D21F40}"/>
+          </ac:cxnSpMkLst>
+        </pc:cxnChg>
+        <pc:cxnChg chg="add mod">
+          <ac:chgData name="Nils Berzins" userId="77cacb0c9cb296b2" providerId="LiveId" clId="{AE3A7C52-4101-497C-9134-A09D1FCE2924}" dt="2025-06-03T01:50:56.856" v="1067" actId="1035"/>
+          <ac:cxnSpMkLst>
+            <pc:docMk/>
+            <pc:sldMk cId="3821736867" sldId="258"/>
+            <ac:cxnSpMk id="14" creationId="{388E63B1-4AB1-62C1-E305-26AFC014D6C0}"/>
+          </ac:cxnSpMkLst>
+        </pc:cxnChg>
+        <pc:cxnChg chg="add mod">
+          <ac:chgData name="Nils Berzins" userId="77cacb0c9cb296b2" providerId="LiveId" clId="{AE3A7C52-4101-497C-9134-A09D1FCE2924}" dt="2025-06-03T01:50:16.128" v="1012" actId="1035"/>
+          <ac:cxnSpMkLst>
+            <pc:docMk/>
+            <pc:sldMk cId="3821736867" sldId="258"/>
+            <ac:cxnSpMk id="17" creationId="{4EF11C96-4862-107B-3FD1-1D59E9C88EBF}"/>
+          </ac:cxnSpMkLst>
+        </pc:cxnChg>
+        <pc:cxnChg chg="add mod">
+          <ac:chgData name="Nils Berzins" userId="77cacb0c9cb296b2" providerId="LiveId" clId="{AE3A7C52-4101-497C-9134-A09D1FCE2924}" dt="2025-06-03T01:54:16.598" v="1147" actId="14100"/>
+          <ac:cxnSpMkLst>
+            <pc:docMk/>
+            <pc:sldMk cId="3821736867" sldId="258"/>
+            <ac:cxnSpMk id="23" creationId="{7BF77BBC-A602-204F-6E82-EC1B20A306B3}"/>
+          </ac:cxnSpMkLst>
+        </pc:cxnChg>
+        <pc:cxnChg chg="add mod">
+          <ac:chgData name="Nils Berzins" userId="77cacb0c9cb296b2" providerId="LiveId" clId="{AE3A7C52-4101-497C-9134-A09D1FCE2924}" dt="2025-06-03T01:50:56.856" v="1067" actId="1035"/>
+          <ac:cxnSpMkLst>
+            <pc:docMk/>
+            <pc:sldMk cId="3821736867" sldId="258"/>
+            <ac:cxnSpMk id="33" creationId="{57818FA8-5E9E-4FDA-5E03-EDF6F20179FC}"/>
+          </ac:cxnSpMkLst>
+        </pc:cxnChg>
+      </pc:sldChg>
+      <pc:sldChg chg="del">
+        <pc:chgData name="Nils Berzins" userId="77cacb0c9cb296b2" providerId="LiveId" clId="{AE3A7C52-4101-497C-9134-A09D1FCE2924}" dt="2025-06-03T01:52:41.940" v="1130" actId="47"/>
+        <pc:sldMkLst>
+          <pc:docMk/>
+          <pc:sldMk cId="810591715" sldId="259"/>
+        </pc:sldMkLst>
+      </pc:sldChg>
+      <pc:sldChg chg="addSp modSp new mod ord setBg">
+        <pc:chgData name="Nils Berzins" userId="77cacb0c9cb296b2" providerId="LiveId" clId="{AE3A7C52-4101-497C-9134-A09D1FCE2924}" dt="2025-06-03T02:30:49.844" v="2382" actId="20577"/>
+        <pc:sldMkLst>
+          <pc:docMk/>
+          <pc:sldMk cId="1096804238" sldId="259"/>
+        </pc:sldMkLst>
+        <pc:spChg chg="mod">
+          <ac:chgData name="Nils Berzins" userId="77cacb0c9cb296b2" providerId="LiveId" clId="{AE3A7C52-4101-497C-9134-A09D1FCE2924}" dt="2025-06-03T02:29:46.615" v="2284" actId="26606"/>
+          <ac:spMkLst>
+            <pc:docMk/>
+            <pc:sldMk cId="1096804238" sldId="259"/>
+            <ac:spMk id="2" creationId="{DE3C2B44-98EC-F444-BF05-99FBFCE49922}"/>
+          </ac:spMkLst>
+        </pc:spChg>
+        <pc:spChg chg="mod">
+          <ac:chgData name="Nils Berzins" userId="77cacb0c9cb296b2" providerId="LiveId" clId="{AE3A7C52-4101-497C-9134-A09D1FCE2924}" dt="2025-06-03T02:30:49.844" v="2382" actId="20577"/>
+          <ac:spMkLst>
+            <pc:docMk/>
+            <pc:sldMk cId="1096804238" sldId="259"/>
+            <ac:spMk id="3" creationId="{14C7575C-6E28-1930-1BBC-8E1A53E9B3E1}"/>
+          </ac:spMkLst>
+        </pc:spChg>
+        <pc:spChg chg="add">
+          <ac:chgData name="Nils Berzins" userId="77cacb0c9cb296b2" providerId="LiveId" clId="{AE3A7C52-4101-497C-9134-A09D1FCE2924}" dt="2025-06-03T02:29:46.615" v="2284" actId="26606"/>
+          <ac:spMkLst>
+            <pc:docMk/>
+            <pc:sldMk cId="1096804238" sldId="259"/>
+            <ac:spMk id="10" creationId="{2961259D-605E-E200-FF9F-7C8C71D7C8E4}"/>
+          </ac:spMkLst>
+        </pc:spChg>
+        <pc:picChg chg="add mod">
+          <ac:chgData name="Nils Berzins" userId="77cacb0c9cb296b2" providerId="LiveId" clId="{AE3A7C52-4101-497C-9134-A09D1FCE2924}" dt="2025-06-03T02:29:46.615" v="2284" actId="26606"/>
+          <ac:picMkLst>
+            <pc:docMk/>
+            <pc:sldMk cId="1096804238" sldId="259"/>
+            <ac:picMk id="5" creationId="{DD396B86-BE67-C2C9-6658-57BE2F3C521D}"/>
+          </ac:picMkLst>
+        </pc:picChg>
+      </pc:sldChg>
+      <pc:sldChg chg="modSp new mod">
+        <pc:chgData name="Nils Berzins" userId="77cacb0c9cb296b2" providerId="LiveId" clId="{AE3A7C52-4101-497C-9134-A09D1FCE2924}" dt="2025-06-03T02:43:33.023" v="3383" actId="20577"/>
+        <pc:sldMkLst>
+          <pc:docMk/>
+          <pc:sldMk cId="2585216105" sldId="260"/>
+        </pc:sldMkLst>
+        <pc:spChg chg="mod">
+          <ac:chgData name="Nils Berzins" userId="77cacb0c9cb296b2" providerId="LiveId" clId="{AE3A7C52-4101-497C-9134-A09D1FCE2924}" dt="2025-06-03T02:24:21.439" v="1730" actId="20577"/>
+          <ac:spMkLst>
+            <pc:docMk/>
+            <pc:sldMk cId="2585216105" sldId="260"/>
+            <ac:spMk id="2" creationId="{9662517C-C55B-B654-689F-E625BED33AB0}"/>
+          </ac:spMkLst>
+        </pc:spChg>
+        <pc:spChg chg="mod">
+          <ac:chgData name="Nils Berzins" userId="77cacb0c9cb296b2" providerId="LiveId" clId="{AE3A7C52-4101-497C-9134-A09D1FCE2924}" dt="2025-06-03T02:43:33.023" v="3383" actId="20577"/>
+          <ac:spMkLst>
+            <pc:docMk/>
+            <pc:sldMk cId="2585216105" sldId="260"/>
+            <ac:spMk id="3" creationId="{50E9E1BB-71A8-725A-7363-8FF19A555CB3}"/>
           </ac:spMkLst>
         </pc:spChg>
       </pc:sldChg>
@@ -154,22 +598,6 @@
           <pc:docMk/>
           <pc:sldMk cId="4232601327" sldId="257"/>
         </pc:sldMkLst>
-        <pc:spChg chg="add mod">
-          <ac:chgData name="Nils Berzins" userId="77cacb0c9cb296b2" providerId="LiveId" clId="{B1183234-40DD-4B27-9335-FC6AD54E1B64}" dt="2025-05-06T18:18:32.395" v="1676" actId="5793"/>
-          <ac:spMkLst>
-            <pc:docMk/>
-            <pc:sldMk cId="4232601327" sldId="257"/>
-            <ac:spMk id="6" creationId="{DE6E109B-91E7-DDAF-A7B2-A879DB699CB1}"/>
-          </ac:spMkLst>
-        </pc:spChg>
-        <pc:picChg chg="add mod">
-          <ac:chgData name="Nils Berzins" userId="77cacb0c9cb296b2" providerId="LiveId" clId="{B1183234-40DD-4B27-9335-FC6AD54E1B64}" dt="2025-05-06T17:09:11.033" v="3" actId="1076"/>
-          <ac:picMkLst>
-            <pc:docMk/>
-            <pc:sldMk cId="4232601327" sldId="257"/>
-            <ac:picMk id="5" creationId="{E87B34DD-CFD1-8080-9B5A-CA2128E59F5D}"/>
-          </ac:picMkLst>
-        </pc:picChg>
       </pc:sldChg>
       <pc:sldChg chg="addSp delSp modSp mod setBg">
         <pc:chgData name="Nils Berzins" userId="77cacb0c9cb296b2" providerId="LiveId" clId="{B1183234-40DD-4B27-9335-FC6AD54E1B64}" dt="2025-05-06T18:11:34.998" v="1382" actId="1076"/>
@@ -185,46 +613,6 @@
             <ac:spMk id="2" creationId="{7B7FA702-CC80-2A76-114B-ADCD3C6ACB2D}"/>
           </ac:spMkLst>
         </pc:spChg>
-        <pc:spChg chg="mod">
-          <ac:chgData name="Nils Berzins" userId="77cacb0c9cb296b2" providerId="LiveId" clId="{B1183234-40DD-4B27-9335-FC6AD54E1B64}" dt="2025-05-06T18:10:37.995" v="1368" actId="1076"/>
-          <ac:spMkLst>
-            <pc:docMk/>
-            <pc:sldMk cId="3821736867" sldId="258"/>
-            <ac:spMk id="3" creationId="{1E7E9B47-42D4-9981-980A-0D6F0F3D70EC}"/>
-          </ac:spMkLst>
-        </pc:spChg>
-        <pc:spChg chg="add">
-          <ac:chgData name="Nils Berzins" userId="77cacb0c9cb296b2" providerId="LiveId" clId="{B1183234-40DD-4B27-9335-FC6AD54E1B64}" dt="2025-05-06T18:09:22.367" v="1236" actId="26606"/>
-          <ac:spMkLst>
-            <pc:docMk/>
-            <pc:sldMk cId="3821736867" sldId="258"/>
-            <ac:spMk id="19" creationId="{2C5AECB1-8254-3357-3EB3-6A75DA093109}"/>
-          </ac:spMkLst>
-        </pc:spChg>
-        <pc:picChg chg="add mod ord modCrop">
-          <ac:chgData name="Nils Berzins" userId="77cacb0c9cb296b2" providerId="LiveId" clId="{B1183234-40DD-4B27-9335-FC6AD54E1B64}" dt="2025-05-06T18:11:34.998" v="1382" actId="1076"/>
-          <ac:picMkLst>
-            <pc:docMk/>
-            <pc:sldMk cId="3821736867" sldId="258"/>
-            <ac:picMk id="5" creationId="{B51DC1DD-0207-8F93-041D-BBE3C530241C}"/>
-          </ac:picMkLst>
-        </pc:picChg>
-        <pc:picChg chg="add mod modCrop">
-          <ac:chgData name="Nils Berzins" userId="77cacb0c9cb296b2" providerId="LiveId" clId="{B1183234-40DD-4B27-9335-FC6AD54E1B64}" dt="2025-05-06T18:11:24.859" v="1379" actId="732"/>
-          <ac:picMkLst>
-            <pc:docMk/>
-            <pc:sldMk cId="3821736867" sldId="258"/>
-            <ac:picMk id="7" creationId="{737C2DB5-0AB6-ED31-15C7-6167FA55F737}"/>
-          </ac:picMkLst>
-        </pc:picChg>
-        <pc:picChg chg="add mod ord">
-          <ac:chgData name="Nils Berzins" userId="77cacb0c9cb296b2" providerId="LiveId" clId="{B1183234-40DD-4B27-9335-FC6AD54E1B64}" dt="2025-05-06T18:10:51.502" v="1370" actId="208"/>
-          <ac:picMkLst>
-            <pc:docMk/>
-            <pc:sldMk cId="3821736867" sldId="258"/>
-            <ac:picMk id="9" creationId="{B77CABA6-DD8F-6FA7-A3F4-E91938C8CD52}"/>
-          </ac:picMkLst>
-        </pc:picChg>
       </pc:sldChg>
       <pc:sldChg chg="addSp delSp modSp mod setBg">
         <pc:chgData name="Nils Berzins" userId="77cacb0c9cb296b2" providerId="LiveId" clId="{B1183234-40DD-4B27-9335-FC6AD54E1B64}" dt="2025-05-06T18:30:07.232" v="2443" actId="207"/>
@@ -232,46 +620,6 @@
           <pc:docMk/>
           <pc:sldMk cId="810591715" sldId="259"/>
         </pc:sldMkLst>
-        <pc:spChg chg="mod ord">
-          <ac:chgData name="Nils Berzins" userId="77cacb0c9cb296b2" providerId="LiveId" clId="{B1183234-40DD-4B27-9335-FC6AD54E1B64}" dt="2025-05-06T18:29:22.283" v="2407" actId="1076"/>
-          <ac:spMkLst>
-            <pc:docMk/>
-            <pc:sldMk cId="810591715" sldId="259"/>
-            <ac:spMk id="2" creationId="{130A7FC6-ECB7-45C8-D205-0D07C57D242A}"/>
-          </ac:spMkLst>
-        </pc:spChg>
-        <pc:spChg chg="add mod ord">
-          <ac:chgData name="Nils Berzins" userId="77cacb0c9cb296b2" providerId="LiveId" clId="{B1183234-40DD-4B27-9335-FC6AD54E1B64}" dt="2025-05-06T18:30:07.232" v="2443" actId="207"/>
-          <ac:spMkLst>
-            <pc:docMk/>
-            <pc:sldMk cId="810591715" sldId="259"/>
-            <ac:spMk id="4" creationId="{ECB0BDD7-A227-C890-D70D-FFFAB57A383F}"/>
-          </ac:spMkLst>
-        </pc:spChg>
-        <pc:spChg chg="add mod ord">
-          <ac:chgData name="Nils Berzins" userId="77cacb0c9cb296b2" providerId="LiveId" clId="{B1183234-40DD-4B27-9335-FC6AD54E1B64}" dt="2025-05-06T18:29:53.068" v="2419" actId="27636"/>
-          <ac:spMkLst>
-            <pc:docMk/>
-            <pc:sldMk cId="810591715" sldId="259"/>
-            <ac:spMk id="17" creationId="{04BB79EE-14F3-69B4-B75E-C452211DA388}"/>
-          </ac:spMkLst>
-        </pc:spChg>
-        <pc:spChg chg="add">
-          <ac:chgData name="Nils Berzins" userId="77cacb0c9cb296b2" providerId="LiveId" clId="{B1183234-40DD-4B27-9335-FC6AD54E1B64}" dt="2025-05-06T18:26:51.984" v="2336" actId="26606"/>
-          <ac:spMkLst>
-            <pc:docMk/>
-            <pc:sldMk cId="810591715" sldId="259"/>
-            <ac:spMk id="1037" creationId="{BA2AFC67-0973-EC0D-F14E-710D701B20BD}"/>
-          </ac:spMkLst>
-        </pc:spChg>
-        <pc:picChg chg="add mod ord">
-          <ac:chgData name="Nils Berzins" userId="77cacb0c9cb296b2" providerId="LiveId" clId="{B1183234-40DD-4B27-9335-FC6AD54E1B64}" dt="2025-05-06T18:27:53.292" v="2349" actId="14100"/>
-          <ac:picMkLst>
-            <pc:docMk/>
-            <pc:sldMk cId="810591715" sldId="259"/>
-            <ac:picMk id="1033" creationId="{94B7880D-62CD-895F-65EA-9E486F2C9CBF}"/>
-          </ac:picMkLst>
-        </pc:picChg>
       </pc:sldChg>
     </pc:docChg>
   </pc:docChgLst>
@@ -3982,243 +4330,6 @@
 <file path=ppt/slides/slide2.xml><?xml version="1.0" encoding="utf-8"?>
 <p:sld xmlns:a="http://schemas.openxmlformats.org/drawingml/2006/main" xmlns:r="http://schemas.openxmlformats.org/officeDocument/2006/relationships" xmlns:p="http://schemas.openxmlformats.org/presentationml/2006/main">
   <p:cSld>
-    <p:spTree>
-      <p:nvGrpSpPr>
-        <p:cNvPr id="1" name=""/>
-        <p:cNvGrpSpPr/>
-        <p:nvPr/>
-      </p:nvGrpSpPr>
-      <p:grpSpPr>
-        <a:xfrm>
-          <a:off x="0" y="0"/>
-          <a:ext cx="0" cy="0"/>
-          <a:chOff x="0" y="0"/>
-          <a:chExt cx="0" cy="0"/>
-        </a:xfrm>
-      </p:grpSpPr>
-      <p:sp>
-        <p:nvSpPr>
-          <p:cNvPr id="2" name="Title 1">
-            <a:extLst>
-              <a:ext uri="{FF2B5EF4-FFF2-40B4-BE49-F238E27FC236}">
-                <a16:creationId xmlns:a16="http://schemas.microsoft.com/office/drawing/2014/main" id="{65617827-B9C1-33F1-BEBF-523DE574147A}"/>
-              </a:ext>
-            </a:extLst>
-          </p:cNvPr>
-          <p:cNvSpPr>
-            <a:spLocks noGrp="1"/>
-          </p:cNvSpPr>
-          <p:nvPr>
-            <p:ph type="title"/>
-          </p:nvPr>
-        </p:nvSpPr>
-        <p:spPr/>
-        <p:txBody>
-          <a:bodyPr/>
-          <a:lstStyle/>
-          <a:p>
-            <a:r>
-              <a:rPr lang="en-US" dirty="0"/>
-              <a:t>Data Collection Plan/Process</a:t>
-            </a:r>
-          </a:p>
-        </p:txBody>
-      </p:sp>
-      <p:pic>
-        <p:nvPicPr>
-          <p:cNvPr id="5" name="Picture 4">
-            <a:extLst>
-              <a:ext uri="{FF2B5EF4-FFF2-40B4-BE49-F238E27FC236}">
-                <a16:creationId xmlns:a16="http://schemas.microsoft.com/office/drawing/2014/main" id="{E87B34DD-CFD1-8080-9B5A-CA2128E59F5D}"/>
-              </a:ext>
-            </a:extLst>
-          </p:cNvPr>
-          <p:cNvPicPr>
-            <a:picLocks noChangeAspect="1"/>
-          </p:cNvPicPr>
-          <p:nvPr/>
-        </p:nvPicPr>
-        <p:blipFill>
-          <a:blip r:embed="rId2"/>
-          <a:stretch>
-            <a:fillRect/>
-          </a:stretch>
-        </p:blipFill>
-        <p:spPr>
-          <a:xfrm>
-            <a:off x="7438356" y="0"/>
-            <a:ext cx="4753644" cy="6858000"/>
-          </a:xfrm>
-          <a:prstGeom prst="rect">
-            <a:avLst/>
-          </a:prstGeom>
-        </p:spPr>
-      </p:pic>
-      <p:sp>
-        <p:nvSpPr>
-          <p:cNvPr id="6" name="TextBox 5">
-            <a:extLst>
-              <a:ext uri="{FF2B5EF4-FFF2-40B4-BE49-F238E27FC236}">
-                <a16:creationId xmlns:a16="http://schemas.microsoft.com/office/drawing/2014/main" id="{DE6E109B-91E7-DDAF-A7B2-A879DB699CB1}"/>
-              </a:ext>
-            </a:extLst>
-          </p:cNvPr>
-          <p:cNvSpPr txBox="1"/>
-          <p:nvPr/>
-        </p:nvSpPr>
-        <p:spPr>
-          <a:xfrm>
-            <a:off x="712033" y="1446551"/>
-            <a:ext cx="6205928" cy="4801314"/>
-          </a:xfrm>
-          <a:prstGeom prst="rect">
-            <a:avLst/>
-          </a:prstGeom>
-          <a:noFill/>
-        </p:spPr>
-        <p:txBody>
-          <a:bodyPr wrap="square" rtlCol="0">
-            <a:spAutoFit/>
-          </a:bodyPr>
-          <a:lstStyle/>
-          <a:p>
-            <a:pPr marL="285750" indent="-285750">
-              <a:buFont typeface="Arial" panose="020B0604020202020204" pitchFamily="34" charset="0"/>
-              <a:buChar char="•"/>
-            </a:pPr>
-            <a:r>
-              <a:rPr lang="en-US" dirty="0"/>
-              <a:t>Data from </a:t>
-            </a:r>
-            <a:r>
-              <a:rPr lang="en-US" dirty="0" err="1"/>
-              <a:t>ExchangeRate</a:t>
-            </a:r>
-            <a:r>
-              <a:rPr lang="en-US" dirty="0"/>
-              <a:t>-API</a:t>
-            </a:r>
-            <a:br>
-              <a:rPr lang="en-US" dirty="0"/>
-            </a:br>
-            <a:endParaRPr lang="en-US" dirty="0"/>
-          </a:p>
-          <a:p>
-            <a:pPr marL="742950" lvl="1" indent="-285750">
-              <a:buFont typeface="Arial" panose="020B0604020202020204" pitchFamily="34" charset="0"/>
-              <a:buChar char="•"/>
-            </a:pPr>
-            <a:r>
-              <a:rPr lang="en-US" dirty="0"/>
-              <a:t>1 request = 1 days exchange rate data</a:t>
-            </a:r>
-            <a:br>
-              <a:rPr lang="en-US" dirty="0"/>
-            </a:br>
-            <a:endParaRPr lang="en-US" dirty="0"/>
-          </a:p>
-          <a:p>
-            <a:pPr marL="742950" lvl="1" indent="-285750">
-              <a:buFont typeface="Arial" panose="020B0604020202020204" pitchFamily="34" charset="0"/>
-              <a:buChar char="•"/>
-            </a:pPr>
-            <a:r>
-              <a:rPr lang="en-US" dirty="0"/>
-              <a:t>Returned JSON data therefore using pandas </a:t>
-            </a:r>
-            <a:r>
-              <a:rPr lang="en-US" dirty="0" err="1"/>
-              <a:t>json_normalize</a:t>
-            </a:r>
-            <a:r>
-              <a:rPr lang="en-US" dirty="0"/>
-              <a:t>.</a:t>
-            </a:r>
-            <a:br>
-              <a:rPr lang="en-US" dirty="0"/>
-            </a:br>
-            <a:endParaRPr lang="en-US" dirty="0"/>
-          </a:p>
-          <a:p>
-            <a:pPr marL="742950" lvl="1" indent="-285750">
-              <a:buFont typeface="Arial" panose="020B0604020202020204" pitchFamily="34" charset="0"/>
-              <a:buChar char="•"/>
-            </a:pPr>
-            <a:r>
-              <a:rPr lang="en-US" dirty="0"/>
-              <a:t>256,211 </a:t>
-            </a:r>
-            <a:r>
-              <a:rPr lang="en-US" dirty="0" err="1"/>
-              <a:t>obs</a:t>
-            </a:r>
-            <a:r>
-              <a:rPr lang="en-US" dirty="0"/>
-              <a:t> in dataset between 2021-01-01 to today.</a:t>
-            </a:r>
-          </a:p>
-          <a:p>
-            <a:endParaRPr lang="en-US" dirty="0"/>
-          </a:p>
-          <a:p>
-            <a:pPr marL="285750" indent="-285750">
-              <a:buFont typeface="Arial" panose="020B0604020202020204" pitchFamily="34" charset="0"/>
-              <a:buChar char="•"/>
-            </a:pPr>
-            <a:r>
-              <a:rPr lang="en-US" dirty="0"/>
-              <a:t>Data Collection Next Steps:</a:t>
-            </a:r>
-          </a:p>
-          <a:p>
-            <a:pPr marL="285750" indent="-285750">
-              <a:buFont typeface="Arial" panose="020B0604020202020204" pitchFamily="34" charset="0"/>
-              <a:buChar char="•"/>
-            </a:pPr>
-            <a:endParaRPr lang="en-US" dirty="0"/>
-          </a:p>
-          <a:p>
-            <a:pPr marL="742950" lvl="1" indent="-285750">
-              <a:buFont typeface="Arial" panose="020B0604020202020204" pitchFamily="34" charset="0"/>
-              <a:buChar char="•"/>
-            </a:pPr>
-            <a:r>
-              <a:rPr lang="en-US" dirty="0"/>
-              <a:t>Parsing other Forex data sources and country borrowing rates data</a:t>
-            </a:r>
-          </a:p>
-          <a:p>
-            <a:pPr lvl="1"/>
-            <a:endParaRPr lang="en-US" dirty="0"/>
-          </a:p>
-          <a:p>
-            <a:pPr marL="742950" lvl="1" indent="-285750">
-              <a:buFont typeface="Arial" panose="020B0604020202020204" pitchFamily="34" charset="0"/>
-              <a:buChar char="•"/>
-            </a:pPr>
-            <a:r>
-              <a:rPr lang="en-US" dirty="0"/>
-              <a:t>Calculating new variables e.g. 10–30-day momentum, 30-day variance, etc.</a:t>
-            </a:r>
-          </a:p>
-        </p:txBody>
-      </p:sp>
-    </p:spTree>
-    <p:extLst>
-      <p:ext uri="{BB962C8B-B14F-4D97-AF65-F5344CB8AC3E}">
-        <p14:creationId xmlns:p14="http://schemas.microsoft.com/office/powerpoint/2010/main" val="4232601327"/>
-      </p:ext>
-    </p:extLst>
-  </p:cSld>
-  <p:clrMapOvr>
-    <a:masterClrMapping/>
-  </p:clrMapOvr>
-</p:sld>
-</file>
-
-<file path=ppt/slides/slide3.xml><?xml version="1.0" encoding="utf-8"?>
-<p:sld xmlns:a="http://schemas.openxmlformats.org/drawingml/2006/main" xmlns:r="http://schemas.openxmlformats.org/officeDocument/2006/relationships" xmlns:p="http://schemas.openxmlformats.org/presentationml/2006/main">
-  <p:cSld>
     <p:bg>
       <p:bgPr>
         <a:solidFill>
@@ -4243,10 +4354,10 @@
       </p:grpSpPr>
       <p:sp>
         <p:nvSpPr>
-          <p:cNvPr id="19" name="Rectangle 18">
-            <a:extLst>
-              <a:ext uri="{FF2B5EF4-FFF2-40B4-BE49-F238E27FC236}">
-                <a16:creationId xmlns:a16="http://schemas.microsoft.com/office/drawing/2014/main" id="{2C5AECB1-8254-3357-3EB3-6A75DA093109}"/>
+          <p:cNvPr id="9" name="Rectangle 8">
+            <a:extLst>
+              <a:ext uri="{FF2B5EF4-FFF2-40B4-BE49-F238E27FC236}">
+                <a16:creationId xmlns:a16="http://schemas.microsoft.com/office/drawing/2014/main" id="{0EECA69B-4C2A-7F31-8019-E90DB3BD49CB}"/>
               </a:ext>
               <a:ext uri="{C183D7F6-B498-43B3-948B-1728B52AA6E4}">
                 <adec:decorative xmlns:adec="http://schemas.microsoft.com/office/drawing/2017/decorative" val="1"/>
@@ -4315,153 +4426,46 @@
           <a:bodyPr rtlCol="0" anchor="ctr"/>
           <a:lstStyle/>
           <a:p>
-            <a:pPr algn="ctr"/>
-            <a:endParaRPr lang="en-US"/>
-          </a:p>
-        </p:txBody>
-      </p:sp>
-      <p:sp>
-        <p:nvSpPr>
-          <p:cNvPr id="2" name="Title 1">
-            <a:extLst>
-              <a:ext uri="{FF2B5EF4-FFF2-40B4-BE49-F238E27FC236}">
-                <a16:creationId xmlns:a16="http://schemas.microsoft.com/office/drawing/2014/main" id="{7B7FA702-CC80-2A76-114B-ADCD3C6ACB2D}"/>
-              </a:ext>
-            </a:extLst>
-          </p:cNvPr>
-          <p:cNvSpPr>
-            <a:spLocks noGrp="1"/>
-          </p:cNvSpPr>
-          <p:nvPr>
-            <p:ph type="title"/>
-          </p:nvPr>
-        </p:nvSpPr>
-        <p:spPr>
-          <a:xfrm>
-            <a:off x="612647" y="375383"/>
-            <a:ext cx="6810129" cy="783015"/>
-          </a:xfrm>
-        </p:spPr>
-        <p:txBody>
-          <a:bodyPr anchor="b">
-            <a:normAutofit/>
-          </a:bodyPr>
-          <a:lstStyle/>
-          <a:p>
-            <a:r>
-              <a:rPr lang="en-US" dirty="0"/>
-              <a:t>EDA</a:t>
-            </a:r>
-          </a:p>
-        </p:txBody>
-      </p:sp>
-      <p:sp>
-        <p:nvSpPr>
-          <p:cNvPr id="3" name="Content Placeholder 2">
-            <a:extLst>
-              <a:ext uri="{FF2B5EF4-FFF2-40B4-BE49-F238E27FC236}">
-                <a16:creationId xmlns:a16="http://schemas.microsoft.com/office/drawing/2014/main" id="{1E7E9B47-42D4-9981-980A-0D6F0F3D70EC}"/>
-              </a:ext>
-            </a:extLst>
-          </p:cNvPr>
-          <p:cNvSpPr>
-            <a:spLocks noGrp="1"/>
-          </p:cNvSpPr>
-          <p:nvPr>
-            <p:ph idx="1"/>
-          </p:nvPr>
-        </p:nvSpPr>
-        <p:spPr>
-          <a:xfrm>
-            <a:off x="612647" y="1158398"/>
-            <a:ext cx="3891976" cy="4096512"/>
-          </a:xfrm>
-        </p:spPr>
-        <p:txBody>
-          <a:bodyPr>
-            <a:normAutofit/>
-          </a:bodyPr>
-          <a:lstStyle/>
-          <a:p>
-            <a:r>
-              <a:rPr lang="en-US" sz="1800" dirty="0"/>
-              <a:t>Well-managed API/Dataset</a:t>
-            </a:r>
-          </a:p>
-          <a:p>
-            <a:pPr lvl="1"/>
-            <a:r>
-              <a:rPr lang="en-US" dirty="0"/>
-              <a:t>Null Counts:</a:t>
-            </a:r>
-          </a:p>
-          <a:p>
-            <a:pPr lvl="2"/>
-            <a:r>
-              <a:rPr lang="en-US" sz="1800" dirty="0"/>
-              <a:t>Currency: 0</a:t>
-            </a:r>
-          </a:p>
-          <a:p>
-            <a:pPr lvl="2"/>
-            <a:r>
-              <a:rPr lang="en-US" sz="1800" dirty="0"/>
-              <a:t>Exchange Rate: 0</a:t>
-            </a:r>
-          </a:p>
-          <a:p>
-            <a:pPr lvl="2"/>
-            <a:r>
-              <a:rPr lang="en-US" sz="1800" dirty="0"/>
-              <a:t>Date: 0</a:t>
-            </a:r>
-          </a:p>
-          <a:p>
-            <a:r>
-              <a:rPr lang="en-US" sz="1800" dirty="0"/>
-              <a:t>Changes in World Currencies – Newly Retired/Adopted</a:t>
-            </a:r>
-          </a:p>
-          <a:p>
-            <a:pPr lvl="1"/>
-            <a:r>
-              <a:rPr lang="en-US" sz="1600" dirty="0"/>
-              <a:t>ZWL </a:t>
-            </a:r>
-            <a:r>
-              <a:rPr lang="en-US" sz="1600" dirty="0">
-                <a:sym typeface="Wingdings" panose="05000000000000000000" pitchFamily="2" charset="2"/>
-              </a:rPr>
-              <a:t> </a:t>
-            </a:r>
-            <a:r>
-              <a:rPr lang="en-US" sz="1600" dirty="0" err="1">
-                <a:sym typeface="Wingdings" panose="05000000000000000000" pitchFamily="2" charset="2"/>
-              </a:rPr>
-              <a:t>ZiG</a:t>
-            </a:r>
-            <a:endParaRPr lang="en-US" sz="1600" dirty="0">
-              <a:sym typeface="Wingdings" panose="05000000000000000000" pitchFamily="2" charset="2"/>
+            <a:pPr marL="0" marR="0" lvl="0" indent="0" algn="ctr" defTabSz="914400" rtl="0" eaLnBrk="1" fontAlgn="auto" latinLnBrk="0" hangingPunct="1">
+              <a:lnSpc>
+                <a:spcPct val="100000"/>
+              </a:lnSpc>
+              <a:spcBef>
+                <a:spcPts val="0"/>
+              </a:spcBef>
+              <a:spcAft>
+                <a:spcPts val="0"/>
+              </a:spcAft>
+              <a:buClrTx/>
+              <a:buSzTx/>
+              <a:buFontTx/>
+              <a:buNone/>
+              <a:tabLst/>
+              <a:defRPr/>
+            </a:pPr>
+            <a:endParaRPr kumimoji="0" lang="en-US" sz="1800" b="0" i="0" u="none" strike="noStrike" kern="1200" cap="none" spc="0" normalizeH="0" baseline="0" noProof="0">
+              <a:ln>
+                <a:noFill/>
+              </a:ln>
+              <a:solidFill>
+                <a:prstClr val="white"/>
+              </a:solidFill>
+              <a:effectLst/>
+              <a:uLnTx/>
+              <a:uFillTx/>
+              <a:latin typeface="Neue Haas Grotesk Text Pro"/>
+              <a:ea typeface="+mn-ea"/>
+              <a:cs typeface="+mn-cs"/>
             </a:endParaRPr>
-          </a:p>
-          <a:p>
-            <a:pPr lvl="2"/>
-            <a:r>
-              <a:rPr lang="en-US" sz="1400" dirty="0">
-                <a:sym typeface="Wingdings" panose="05000000000000000000" pitchFamily="2" charset="2"/>
-              </a:rPr>
-              <a:t>Leading to a graphical collapse in the ex-rate. </a:t>
-            </a:r>
-            <a:endParaRPr lang="en-US" sz="1400" dirty="0"/>
           </a:p>
         </p:txBody>
       </p:sp>
       <p:pic>
         <p:nvPicPr>
-          <p:cNvPr id="9" name="Picture 8" descr="A white background with numbers and letters&#10;&#10;AI-generated content may be incorrect.">
-            <a:extLst>
-              <a:ext uri="{FF2B5EF4-FFF2-40B4-BE49-F238E27FC236}">
-                <a16:creationId xmlns:a16="http://schemas.microsoft.com/office/drawing/2014/main" id="{B77CABA6-DD8F-6FA7-A3F4-E91938C8CD52}"/>
+          <p:cNvPr id="4" name="Picture 3" descr="A diagram of a company&#10;&#10;AI-generated content may be incorrect.">
+            <a:extLst>
+              <a:ext uri="{FF2B5EF4-FFF2-40B4-BE49-F238E27FC236}">
+                <a16:creationId xmlns:a16="http://schemas.microsoft.com/office/drawing/2014/main" id="{696080BF-94B2-0A95-D2E0-7AA318B6587A}"/>
               </a:ext>
             </a:extLst>
           </p:cNvPr>
@@ -4472,96 +4476,189 @@
         </p:nvPicPr>
         <p:blipFill>
           <a:blip r:embed="rId2"/>
-          <a:srcRect t="4317" r="-4" b="4715"/>
+          <a:srcRect l="4545" t="8993" r="1136"/>
           <a:stretch/>
         </p:blipFill>
         <p:spPr>
           <a:xfrm>
-            <a:off x="1212233" y="4902302"/>
-            <a:ext cx="2692804" cy="1580315"/>
-          </a:xfrm>
-          <a:prstGeom prst="rect">
-            <a:avLst/>
-          </a:prstGeom>
-          <a:ln>
-            <a:solidFill>
-              <a:schemeClr val="accent1"/>
-            </a:solidFill>
-          </a:ln>
-        </p:spPr>
-      </p:pic>
-      <p:pic>
-        <p:nvPicPr>
-          <p:cNvPr id="7" name="Picture 6" descr="A graph showing the value of a currency&#10;&#10;AI-generated content may be incorrect.">
-            <a:extLst>
-              <a:ext uri="{FF2B5EF4-FFF2-40B4-BE49-F238E27FC236}">
-                <a16:creationId xmlns:a16="http://schemas.microsoft.com/office/drawing/2014/main" id="{737C2DB5-0AB6-ED31-15C7-6167FA55F737}"/>
-              </a:ext>
-            </a:extLst>
-          </p:cNvPr>
-          <p:cNvPicPr>
-            <a:picLocks noChangeAspect="1"/>
-          </p:cNvPicPr>
-          <p:nvPr/>
-        </p:nvPicPr>
-        <p:blipFill>
-          <a:blip r:embed="rId3"/>
-          <a:srcRect l="6025" r="-135" b="-2"/>
-          <a:stretch/>
-        </p:blipFill>
-        <p:spPr>
-          <a:xfrm>
-            <a:off x="5568136" y="3549897"/>
-            <a:ext cx="6623864" cy="3308103"/>
+            <a:off x="20" y="0"/>
+            <a:ext cx="12307310" cy="6858000"/>
           </a:xfrm>
           <a:prstGeom prst="rect">
             <a:avLst/>
           </a:prstGeom>
         </p:spPr>
       </p:pic>
-      <p:pic>
-        <p:nvPicPr>
-          <p:cNvPr id="5" name="Picture 4" descr="A graph showing a line of a graph&#10;&#10;AI-generated content may be incorrect.">
-            <a:extLst>
-              <a:ext uri="{FF2B5EF4-FFF2-40B4-BE49-F238E27FC236}">
-                <a16:creationId xmlns:a16="http://schemas.microsoft.com/office/drawing/2014/main" id="{B51DC1DD-0207-8F93-041D-BBE3C530241C}"/>
-              </a:ext>
-            </a:extLst>
-          </p:cNvPr>
-          <p:cNvPicPr>
-            <a:picLocks noChangeAspect="1"/>
-          </p:cNvPicPr>
-          <p:nvPr/>
-        </p:nvPicPr>
-        <p:blipFill>
-          <a:blip r:embed="rId4"/>
-          <a:srcRect l="2138" r="50" b="-2"/>
-          <a:stretch/>
-        </p:blipFill>
+      <p:sp>
+        <p:nvSpPr>
+          <p:cNvPr id="11" name="Rectangle 10">
+            <a:extLst>
+              <a:ext uri="{FF2B5EF4-FFF2-40B4-BE49-F238E27FC236}">
+                <a16:creationId xmlns:a16="http://schemas.microsoft.com/office/drawing/2014/main" id="{495DEB6A-976D-98B6-8875-F4C240958B3E}"/>
+              </a:ext>
+              <a:ext uri="{C183D7F6-B498-43B3-948B-1728B52AA6E4}">
+                <adec:decorative xmlns:adec="http://schemas.microsoft.com/office/drawing/2017/decorative" val="1"/>
+              </a:ext>
+            </a:extLst>
+          </p:cNvPr>
+          <p:cNvSpPr>
+            <a:spLocks noGrp="1" noRot="1" noChangeAspect="1" noMove="1" noResize="1" noEditPoints="1" noAdjustHandles="1" noChangeArrowheads="1" noChangeShapeType="1" noTextEdit="1"/>
+          </p:cNvSpPr>
+          <p:nvPr>
+            <p:extLst>
+              <p:ext uri="{386F3935-93C4-4BCD-93E2-E3B085C9AB24}">
+                <p16:designElem xmlns:p16="http://schemas.microsoft.com/office/powerpoint/2015/main" val="1"/>
+              </p:ext>
+            </p:extLst>
+          </p:nvPr>
+        </p:nvSpPr>
         <p:spPr>
           <a:xfrm>
-            <a:off x="5568136" y="300789"/>
-            <a:ext cx="6615559" cy="3128211"/>
+            <a:off x="0" y="4114800"/>
+            <a:ext cx="12192000" cy="2743202"/>
           </a:xfrm>
           <a:prstGeom prst="rect">
             <a:avLst/>
           </a:prstGeom>
+          <a:gradFill>
+            <a:gsLst>
+              <a:gs pos="0">
+                <a:schemeClr val="bg1">
+                  <a:alpha val="0"/>
+                </a:schemeClr>
+              </a:gs>
+              <a:gs pos="43000">
+                <a:schemeClr val="bg1">
+                  <a:alpha val="25000"/>
+                </a:schemeClr>
+              </a:gs>
+              <a:gs pos="59000">
+                <a:schemeClr val="bg1">
+                  <a:alpha val="35000"/>
+                </a:schemeClr>
+              </a:gs>
+              <a:gs pos="100000">
+                <a:schemeClr val="bg1">
+                  <a:alpha val="45000"/>
+                </a:schemeClr>
+              </a:gs>
+            </a:gsLst>
+            <a:lin ang="5400000" scaled="1"/>
+          </a:gradFill>
+          <a:ln>
+            <a:noFill/>
+          </a:ln>
         </p:spPr>
-      </p:pic>
+        <p:style>
+          <a:lnRef idx="2">
+            <a:schemeClr val="accent1">
+              <a:shade val="50000"/>
+            </a:schemeClr>
+          </a:lnRef>
+          <a:fillRef idx="1">
+            <a:schemeClr val="accent1"/>
+          </a:fillRef>
+          <a:effectRef idx="0">
+            <a:schemeClr val="accent1"/>
+          </a:effectRef>
+          <a:fontRef idx="minor">
+            <a:schemeClr val="lt1"/>
+          </a:fontRef>
+        </p:style>
+        <p:txBody>
+          <a:bodyPr rtlCol="0" anchor="ctr"/>
+          <a:lstStyle/>
+          <a:p>
+            <a:pPr marL="0" marR="0" lvl="0" indent="0" algn="ctr" defTabSz="914400" rtl="0" eaLnBrk="1" fontAlgn="auto" latinLnBrk="0" hangingPunct="1">
+              <a:lnSpc>
+                <a:spcPct val="100000"/>
+              </a:lnSpc>
+              <a:spcBef>
+                <a:spcPts val="0"/>
+              </a:spcBef>
+              <a:spcAft>
+                <a:spcPts val="0"/>
+              </a:spcAft>
+              <a:buClrTx/>
+              <a:buSzTx/>
+              <a:buFontTx/>
+              <a:buNone/>
+              <a:tabLst/>
+              <a:defRPr/>
+            </a:pPr>
+            <a:endParaRPr kumimoji="0" lang="en-US" sz="1800" b="0" i="0" u="none" strike="noStrike" kern="1200" cap="none" spc="0" normalizeH="0" baseline="0" noProof="0">
+              <a:ln>
+                <a:noFill/>
+              </a:ln>
+              <a:solidFill>
+                <a:prstClr val="white"/>
+              </a:solidFill>
+              <a:effectLst/>
+              <a:uLnTx/>
+              <a:uFillTx/>
+              <a:latin typeface="Neue Haas Grotesk Text Pro"/>
+              <a:ea typeface="+mn-ea"/>
+              <a:cs typeface="+mn-cs"/>
+            </a:endParaRPr>
+          </a:p>
+        </p:txBody>
+      </p:sp>
+      <p:sp>
+        <p:nvSpPr>
+          <p:cNvPr id="2" name="Title 1">
+            <a:extLst>
+              <a:ext uri="{FF2B5EF4-FFF2-40B4-BE49-F238E27FC236}">
+                <a16:creationId xmlns:a16="http://schemas.microsoft.com/office/drawing/2014/main" id="{65617827-B9C1-33F1-BEBF-523DE574147A}"/>
+              </a:ext>
+            </a:extLst>
+          </p:cNvPr>
+          <p:cNvSpPr>
+            <a:spLocks noGrp="1"/>
+          </p:cNvSpPr>
+          <p:nvPr>
+            <p:ph type="title"/>
+          </p:nvPr>
+        </p:nvSpPr>
+        <p:spPr>
+          <a:xfrm>
+            <a:off x="320041" y="5728447"/>
+            <a:ext cx="8201790" cy="960120"/>
+          </a:xfrm>
+          <a:ln>
+            <a:noFill/>
+          </a:ln>
+        </p:spPr>
+        <p:txBody>
+          <a:bodyPr vert="horz" lIns="91440" tIns="45720" rIns="91440" bIns="45720" rtlCol="0" anchor="ctr">
+            <a:normAutofit/>
+          </a:bodyPr>
+          <a:lstStyle/>
+          <a:p>
+            <a:r>
+              <a:rPr lang="en-US" sz="3100" dirty="0"/>
+              <a:t>Full Project Workflow</a:t>
+            </a:r>
+            <a:br>
+              <a:rPr lang="en-US" sz="3100" dirty="0"/>
+            </a:br>
+            <a:endParaRPr lang="en-US" sz="3100" dirty="0"/>
+          </a:p>
+        </p:txBody>
+      </p:sp>
     </p:spTree>
     <p:extLst>
       <p:ext uri="{BB962C8B-B14F-4D97-AF65-F5344CB8AC3E}">
-        <p14:creationId xmlns:p14="http://schemas.microsoft.com/office/powerpoint/2010/main" val="3821736867"/>
+        <p14:creationId xmlns:p14="http://schemas.microsoft.com/office/powerpoint/2010/main" val="4232601327"/>
       </p:ext>
     </p:extLst>
   </p:cSld>
   <p:clrMapOvr>
-    <a:masterClrMapping/>
+    <a:overrideClrMapping bg1="dk1" tx1="lt1" bg2="dk2" tx2="lt2" accent1="accent1" accent2="accent2" accent3="accent3" accent4="accent4" accent5="accent5" accent6="accent6" hlink="hlink" folHlink="folHlink"/>
   </p:clrMapOvr>
 </p:sld>
 </file>
 
-<file path=ppt/slides/slide4.xml><?xml version="1.0" encoding="utf-8"?>
+<file path=ppt/slides/slide3.xml><?xml version="1.0" encoding="utf-8"?>
 <p:sld xmlns:a="http://schemas.openxmlformats.org/drawingml/2006/main" xmlns:r="http://schemas.openxmlformats.org/officeDocument/2006/relationships" xmlns:p="http://schemas.openxmlformats.org/presentationml/2006/main">
   <p:cSld>
     <p:bg>
@@ -4588,10 +4685,10 @@
       </p:grpSpPr>
       <p:sp useBgFill="1">
         <p:nvSpPr>
-          <p:cNvPr id="1037" name="Rectangle 1036">
-            <a:extLst>
-              <a:ext uri="{FF2B5EF4-FFF2-40B4-BE49-F238E27FC236}">
-                <a16:creationId xmlns:a16="http://schemas.microsoft.com/office/drawing/2014/main" id="{BA2AFC67-0973-EC0D-F14E-710D701B20BD}"/>
+          <p:cNvPr id="55" name="Rectangle 54">
+            <a:extLst>
+              <a:ext uri="{FF2B5EF4-FFF2-40B4-BE49-F238E27FC236}">
+                <a16:creationId xmlns:a16="http://schemas.microsoft.com/office/drawing/2014/main" id="{9B65F7F7-2FCE-8F01-53DE-15C39342BE99}"/>
               </a:ext>
               <a:ext uri="{C183D7F6-B498-43B3-948B-1728B52AA6E4}">
                 <adec:decorative xmlns:adec="http://schemas.microsoft.com/office/drawing/2017/decorative" val="1"/>
@@ -4662,12 +4759,48 @@
           </a:p>
         </p:txBody>
       </p:sp>
+      <p:sp>
+        <p:nvSpPr>
+          <p:cNvPr id="2" name="Title 1">
+            <a:extLst>
+              <a:ext uri="{FF2B5EF4-FFF2-40B4-BE49-F238E27FC236}">
+                <a16:creationId xmlns:a16="http://schemas.microsoft.com/office/drawing/2014/main" id="{7B7FA702-CC80-2A76-114B-ADCD3C6ACB2D}"/>
+              </a:ext>
+            </a:extLst>
+          </p:cNvPr>
+          <p:cNvSpPr>
+            <a:spLocks noGrp="1"/>
+          </p:cNvSpPr>
+          <p:nvPr>
+            <p:ph type="title"/>
+          </p:nvPr>
+        </p:nvSpPr>
+        <p:spPr>
+          <a:xfrm>
+            <a:off x="1731821" y="225180"/>
+            <a:ext cx="8728364" cy="689279"/>
+          </a:xfrm>
+        </p:spPr>
+        <p:txBody>
+          <a:bodyPr vert="horz" lIns="91440" tIns="45720" rIns="91440" bIns="45720" rtlCol="0" anchor="b">
+            <a:normAutofit/>
+          </a:bodyPr>
+          <a:lstStyle/>
+          <a:p>
+            <a:pPr algn="ctr"/>
+            <a:r>
+              <a:rPr lang="en-US" dirty="0"/>
+              <a:t>Dashboard App and Functionality</a:t>
+            </a:r>
+          </a:p>
+        </p:txBody>
+      </p:sp>
       <p:pic>
         <p:nvPicPr>
-          <p:cNvPr id="1033" name="Picture 1032">
-            <a:extLst>
-              <a:ext uri="{FF2B5EF4-FFF2-40B4-BE49-F238E27FC236}">
-                <a16:creationId xmlns:a16="http://schemas.microsoft.com/office/drawing/2014/main" id="{94B7880D-62CD-895F-65EA-9E486F2C9CBF}"/>
+          <p:cNvPr id="10" name="Picture 9" descr="A graph with lines and numbers&#10;&#10;AI-generated content may be incorrect.">
+            <a:extLst>
+              <a:ext uri="{FF2B5EF4-FFF2-40B4-BE49-F238E27FC236}">
+                <a16:creationId xmlns:a16="http://schemas.microsoft.com/office/drawing/2014/main" id="{2E942D24-7F0A-30A7-264F-9D9B35310E61}"/>
               </a:ext>
             </a:extLst>
           </p:cNvPr>
@@ -4678,52 +4811,611 @@
         </p:nvPicPr>
         <p:blipFill>
           <a:blip r:embed="rId2"/>
-          <a:srcRect r="38709" b="-445"/>
+          <a:srcRect t="-231" r="1139"/>
           <a:stretch/>
         </p:blipFill>
         <p:spPr>
           <a:xfrm>
-            <a:off x="0" y="10"/>
-            <a:ext cx="12192000" cy="6857990"/>
+            <a:off x="1166719" y="920531"/>
+            <a:ext cx="9425594" cy="5040816"/>
+          </a:xfrm>
+          <a:prstGeom prst="rect">
+            <a:avLst/>
+          </a:prstGeom>
+          <a:ln>
+            <a:solidFill>
+              <a:schemeClr val="accent5">
+                <a:lumMod val="40000"/>
+                <a:lumOff val="60000"/>
+              </a:schemeClr>
+            </a:solidFill>
+          </a:ln>
+        </p:spPr>
+      </p:pic>
+      <p:sp>
+        <p:nvSpPr>
+          <p:cNvPr id="11" name="TextBox 10">
+            <a:extLst>
+              <a:ext uri="{FF2B5EF4-FFF2-40B4-BE49-F238E27FC236}">
+                <a16:creationId xmlns:a16="http://schemas.microsoft.com/office/drawing/2014/main" id="{6384D3D7-4DDF-1FD5-0722-FB3999407A1C}"/>
+              </a:ext>
+            </a:extLst>
+          </p:cNvPr>
+          <p:cNvSpPr txBox="1"/>
+          <p:nvPr/>
+        </p:nvSpPr>
+        <p:spPr>
+          <a:xfrm>
+            <a:off x="3700559" y="1362389"/>
+            <a:ext cx="2125417" cy="523220"/>
+          </a:xfrm>
+          <a:prstGeom prst="rect">
+            <a:avLst/>
+          </a:prstGeom>
+          <a:noFill/>
+          <a:ln>
+            <a:solidFill>
+              <a:schemeClr val="accent5">
+                <a:lumMod val="40000"/>
+                <a:lumOff val="60000"/>
+              </a:schemeClr>
+            </a:solidFill>
+          </a:ln>
+        </p:spPr>
+        <p:txBody>
+          <a:bodyPr wrap="square" rtlCol="0">
+            <a:spAutoFit/>
+          </a:bodyPr>
+          <a:lstStyle/>
+          <a:p>
+            <a:pPr algn="ctr"/>
+            <a:r>
+              <a:rPr lang="en-US" sz="1400" dirty="0"/>
+              <a:t>Choose from all traded world currencies</a:t>
+            </a:r>
+          </a:p>
+        </p:txBody>
+      </p:sp>
+      <p:cxnSp>
+        <p:nvCxnSpPr>
+          <p:cNvPr id="13" name="Straight Arrow Connector 12">
+            <a:extLst>
+              <a:ext uri="{FF2B5EF4-FFF2-40B4-BE49-F238E27FC236}">
+                <a16:creationId xmlns:a16="http://schemas.microsoft.com/office/drawing/2014/main" id="{7AE4822A-9C56-D0D7-8EB8-573F83D21F40}"/>
+              </a:ext>
+            </a:extLst>
+          </p:cNvPr>
+          <p:cNvCxnSpPr/>
+          <p:nvPr/>
+        </p:nvCxnSpPr>
+        <p:spPr>
+          <a:xfrm flipH="1" flipV="1">
+            <a:off x="2908897" y="1196692"/>
+            <a:ext cx="791662" cy="165697"/>
+          </a:xfrm>
+          <a:prstGeom prst="straightConnector1">
+            <a:avLst/>
+          </a:prstGeom>
+          <a:ln>
+            <a:tailEnd type="triangle"/>
+          </a:ln>
+        </p:spPr>
+        <p:style>
+          <a:lnRef idx="1">
+            <a:schemeClr val="accent3"/>
+          </a:lnRef>
+          <a:fillRef idx="0">
+            <a:schemeClr val="accent3"/>
+          </a:fillRef>
+          <a:effectRef idx="0">
+            <a:schemeClr val="accent3"/>
+          </a:effectRef>
+          <a:fontRef idx="minor">
+            <a:schemeClr val="tx1"/>
+          </a:fontRef>
+        </p:style>
+      </p:cxnSp>
+      <p:cxnSp>
+        <p:nvCxnSpPr>
+          <p:cNvPr id="14" name="Straight Arrow Connector 13">
+            <a:extLst>
+              <a:ext uri="{FF2B5EF4-FFF2-40B4-BE49-F238E27FC236}">
+                <a16:creationId xmlns:a16="http://schemas.microsoft.com/office/drawing/2014/main" id="{388E63B1-4AB1-62C1-E305-26AFC014D6C0}"/>
+              </a:ext>
+            </a:extLst>
+          </p:cNvPr>
+          <p:cNvCxnSpPr>
+            <a:cxnSpLocks/>
+          </p:cNvCxnSpPr>
+          <p:nvPr/>
+        </p:nvCxnSpPr>
+        <p:spPr>
+          <a:xfrm flipH="1">
+            <a:off x="2908897" y="1887095"/>
+            <a:ext cx="791662" cy="224060"/>
+          </a:xfrm>
+          <a:prstGeom prst="straightConnector1">
+            <a:avLst/>
+          </a:prstGeom>
+          <a:ln>
+            <a:tailEnd type="triangle"/>
+          </a:ln>
+        </p:spPr>
+        <p:style>
+          <a:lnRef idx="1">
+            <a:schemeClr val="accent3"/>
+          </a:lnRef>
+          <a:fillRef idx="0">
+            <a:schemeClr val="accent3"/>
+          </a:fillRef>
+          <a:effectRef idx="0">
+            <a:schemeClr val="accent3"/>
+          </a:effectRef>
+          <a:fontRef idx="minor">
+            <a:schemeClr val="tx1"/>
+          </a:fontRef>
+        </p:style>
+      </p:cxnSp>
+      <p:sp>
+        <p:nvSpPr>
+          <p:cNvPr id="16" name="TextBox 15">
+            <a:extLst>
+              <a:ext uri="{FF2B5EF4-FFF2-40B4-BE49-F238E27FC236}">
+                <a16:creationId xmlns:a16="http://schemas.microsoft.com/office/drawing/2014/main" id="{79E98074-FD12-65DE-805E-553EC2FE3D58}"/>
+              </a:ext>
+            </a:extLst>
+          </p:cNvPr>
+          <p:cNvSpPr txBox="1"/>
+          <p:nvPr/>
+        </p:nvSpPr>
+        <p:spPr>
+          <a:xfrm>
+            <a:off x="3700557" y="2024300"/>
+            <a:ext cx="2125417" cy="492443"/>
+          </a:xfrm>
+          <a:prstGeom prst="rect">
+            <a:avLst/>
+          </a:prstGeom>
+          <a:noFill/>
+          <a:ln>
+            <a:solidFill>
+              <a:schemeClr val="accent6">
+                <a:lumMod val="40000"/>
+                <a:lumOff val="60000"/>
+              </a:schemeClr>
+            </a:solidFill>
+          </a:ln>
+        </p:spPr>
+        <p:txBody>
+          <a:bodyPr wrap="square" rtlCol="0">
+            <a:spAutoFit/>
+          </a:bodyPr>
+          <a:lstStyle/>
+          <a:p>
+            <a:pPr algn="ctr"/>
+            <a:r>
+              <a:rPr lang="en-US" sz="1300" dirty="0"/>
+              <a:t>Specify “From” currency amount (default 1)</a:t>
+            </a:r>
+          </a:p>
+        </p:txBody>
+      </p:sp>
+      <p:cxnSp>
+        <p:nvCxnSpPr>
+          <p:cNvPr id="17" name="Straight Arrow Connector 16">
+            <a:extLst>
+              <a:ext uri="{FF2B5EF4-FFF2-40B4-BE49-F238E27FC236}">
+                <a16:creationId xmlns:a16="http://schemas.microsoft.com/office/drawing/2014/main" id="{4EF11C96-4862-107B-3FD1-1D59E9C88EBF}"/>
+              </a:ext>
+            </a:extLst>
+          </p:cNvPr>
+          <p:cNvCxnSpPr>
+            <a:cxnSpLocks/>
+          </p:cNvCxnSpPr>
+          <p:nvPr/>
+        </p:nvCxnSpPr>
+        <p:spPr>
+          <a:xfrm flipH="1" flipV="1">
+            <a:off x="2908897" y="1614002"/>
+            <a:ext cx="791662" cy="467039"/>
+          </a:xfrm>
+          <a:prstGeom prst="straightConnector1">
+            <a:avLst/>
+          </a:prstGeom>
+          <a:ln>
+            <a:tailEnd type="triangle"/>
+          </a:ln>
+        </p:spPr>
+        <p:style>
+          <a:lnRef idx="1">
+            <a:schemeClr val="accent1"/>
+          </a:lnRef>
+          <a:fillRef idx="0">
+            <a:schemeClr val="accent1"/>
+          </a:fillRef>
+          <a:effectRef idx="0">
+            <a:schemeClr val="accent1"/>
+          </a:effectRef>
+          <a:fontRef idx="minor">
+            <a:schemeClr val="tx1"/>
+          </a:fontRef>
+        </p:style>
+      </p:cxnSp>
+      <p:sp>
+        <p:nvSpPr>
+          <p:cNvPr id="21" name="TextBox 20">
+            <a:extLst>
+              <a:ext uri="{FF2B5EF4-FFF2-40B4-BE49-F238E27FC236}">
+                <a16:creationId xmlns:a16="http://schemas.microsoft.com/office/drawing/2014/main" id="{E53EF171-584E-F2F1-18C3-DD316D726921}"/>
+              </a:ext>
+            </a:extLst>
+          </p:cNvPr>
+          <p:cNvSpPr txBox="1"/>
+          <p:nvPr/>
+        </p:nvSpPr>
+        <p:spPr>
+          <a:xfrm>
+            <a:off x="7015828" y="2427977"/>
+            <a:ext cx="2687967" cy="738664"/>
           </a:xfrm>
           <a:prstGeom prst="rect">
             <a:avLst/>
           </a:prstGeom>
         </p:spPr>
-      </p:pic>
-      <p:sp>
-        <p:nvSpPr>
-          <p:cNvPr id="4" name="Rectangle 3">
-            <a:extLst>
-              <a:ext uri="{FF2B5EF4-FFF2-40B4-BE49-F238E27FC236}">
-                <a16:creationId xmlns:a16="http://schemas.microsoft.com/office/drawing/2014/main" id="{ECB0BDD7-A227-C890-D70D-FFFAB57A383F}"/>
-              </a:ext>
-            </a:extLst>
-          </p:cNvPr>
-          <p:cNvSpPr/>
+        <p:style>
+          <a:lnRef idx="2">
+            <a:schemeClr val="accent1"/>
+          </a:lnRef>
+          <a:fillRef idx="1">
+            <a:schemeClr val="lt1"/>
+          </a:fillRef>
+          <a:effectRef idx="0">
+            <a:schemeClr val="accent1"/>
+          </a:effectRef>
+          <a:fontRef idx="minor">
+            <a:schemeClr val="dk1"/>
+          </a:fontRef>
+        </p:style>
+        <p:txBody>
+          <a:bodyPr wrap="square" rtlCol="0">
+            <a:spAutoFit/>
+          </a:bodyPr>
+          <a:lstStyle/>
+          <a:p>
+            <a:r>
+              <a:rPr lang="en-US" sz="1400" dirty="0"/>
+              <a:t>Turning on “Forecast” switch runs an ARIMA model and forecasts between 7-30 days.</a:t>
+            </a:r>
+          </a:p>
+        </p:txBody>
+      </p:sp>
+      <p:cxnSp>
+        <p:nvCxnSpPr>
+          <p:cNvPr id="23" name="Straight Arrow Connector 22">
+            <a:extLst>
+              <a:ext uri="{FF2B5EF4-FFF2-40B4-BE49-F238E27FC236}">
+                <a16:creationId xmlns:a16="http://schemas.microsoft.com/office/drawing/2014/main" id="{7BF77BBC-A602-204F-6E82-EC1B20A306B3}"/>
+              </a:ext>
+            </a:extLst>
+          </p:cNvPr>
+          <p:cNvCxnSpPr>
+            <a:cxnSpLocks/>
+          </p:cNvCxnSpPr>
           <p:nvPr/>
-        </p:nvSpPr>
+        </p:nvCxnSpPr>
         <p:spPr>
           <a:xfrm>
-            <a:off x="864282" y="517473"/>
-            <a:ext cx="10463436" cy="5688919"/>
+            <a:off x="9021262" y="3185609"/>
+            <a:ext cx="975769" cy="1858928"/>
+          </a:xfrm>
+          <a:prstGeom prst="straightConnector1">
+            <a:avLst/>
+          </a:prstGeom>
+          <a:ln>
+            <a:tailEnd type="triangle"/>
+          </a:ln>
+        </p:spPr>
+        <p:style>
+          <a:lnRef idx="1">
+            <a:schemeClr val="accent1"/>
+          </a:lnRef>
+          <a:fillRef idx="0">
+            <a:schemeClr val="accent1"/>
+          </a:fillRef>
+          <a:effectRef idx="0">
+            <a:schemeClr val="accent1"/>
+          </a:effectRef>
+          <a:fontRef idx="minor">
+            <a:schemeClr val="tx1"/>
+          </a:fontRef>
+        </p:style>
+      </p:cxnSp>
+      <p:sp>
+        <p:nvSpPr>
+          <p:cNvPr id="25" name="TextBox 24">
+            <a:extLst>
+              <a:ext uri="{FF2B5EF4-FFF2-40B4-BE49-F238E27FC236}">
+                <a16:creationId xmlns:a16="http://schemas.microsoft.com/office/drawing/2014/main" id="{B8E59C4B-A6ED-A2E2-F865-FA35C9C5BD58}"/>
+              </a:ext>
+            </a:extLst>
+          </p:cNvPr>
+          <p:cNvSpPr txBox="1"/>
+          <p:nvPr/>
+        </p:nvSpPr>
+        <p:spPr>
+          <a:xfrm>
+            <a:off x="9217643" y="5411787"/>
+            <a:ext cx="1287022" cy="430887"/>
           </a:xfrm>
           <a:prstGeom prst="rect">
             <a:avLst/>
           </a:prstGeom>
-          <a:solidFill>
-            <a:schemeClr val="bg1">
-              <a:lumMod val="50000"/>
-              <a:alpha val="74000"/>
-            </a:schemeClr>
-          </a:solidFill>
+        </p:spPr>
+        <p:style>
+          <a:lnRef idx="2">
+            <a:schemeClr val="accent1"/>
+          </a:lnRef>
+          <a:fillRef idx="1">
+            <a:schemeClr val="lt1"/>
+          </a:fillRef>
+          <a:effectRef idx="0">
+            <a:schemeClr val="accent1"/>
+          </a:effectRef>
+          <a:fontRef idx="minor">
+            <a:schemeClr val="dk1"/>
+          </a:fontRef>
+        </p:style>
+        <p:txBody>
+          <a:bodyPr wrap="square" rtlCol="0">
+            <a:spAutoFit/>
+          </a:bodyPr>
+          <a:lstStyle/>
+          <a:p>
+            <a:pPr algn="ctr"/>
+            <a:r>
+              <a:rPr lang="en-US" sz="1100" dirty="0"/>
+              <a:t>15 day forecast visible here</a:t>
+            </a:r>
+          </a:p>
+        </p:txBody>
+      </p:sp>
+      <p:sp>
+        <p:nvSpPr>
+          <p:cNvPr id="27" name="TextBox 26">
+            <a:extLst>
+              <a:ext uri="{FF2B5EF4-FFF2-40B4-BE49-F238E27FC236}">
+                <a16:creationId xmlns:a16="http://schemas.microsoft.com/office/drawing/2014/main" id="{37CF974D-A469-C262-D949-90122D07B83F}"/>
+              </a:ext>
+            </a:extLst>
+          </p:cNvPr>
+          <p:cNvSpPr txBox="1"/>
+          <p:nvPr/>
+        </p:nvSpPr>
+        <p:spPr>
+          <a:xfrm>
+            <a:off x="3700557" y="2655676"/>
+            <a:ext cx="2125417" cy="523220"/>
+          </a:xfrm>
+          <a:prstGeom prst="rect">
+            <a:avLst/>
+          </a:prstGeom>
+        </p:spPr>
+        <p:style>
+          <a:lnRef idx="2">
+            <a:schemeClr val="accent2"/>
+          </a:lnRef>
+          <a:fillRef idx="1">
+            <a:schemeClr val="lt1"/>
+          </a:fillRef>
+          <a:effectRef idx="0">
+            <a:schemeClr val="accent2"/>
+          </a:effectRef>
+          <a:fontRef idx="minor">
+            <a:schemeClr val="dk1"/>
+          </a:fontRef>
+        </p:style>
+        <p:txBody>
+          <a:bodyPr wrap="square" rtlCol="0">
+            <a:spAutoFit/>
+          </a:bodyPr>
+          <a:lstStyle/>
+          <a:p>
+            <a:pPr algn="ctr"/>
+            <a:r>
+              <a:rPr lang="en-US" sz="1400" dirty="0"/>
+              <a:t>Find a date range from which to graph/model </a:t>
+            </a:r>
+          </a:p>
+        </p:txBody>
+      </p:sp>
+      <p:cxnSp>
+        <p:nvCxnSpPr>
+          <p:cNvPr id="33" name="Straight Arrow Connector 32">
+            <a:extLst>
+              <a:ext uri="{FF2B5EF4-FFF2-40B4-BE49-F238E27FC236}">
+                <a16:creationId xmlns:a16="http://schemas.microsoft.com/office/drawing/2014/main" id="{57818FA8-5E9E-4FDA-5E03-EDF6F20179FC}"/>
+              </a:ext>
+            </a:extLst>
+          </p:cNvPr>
+          <p:cNvCxnSpPr/>
+          <p:nvPr/>
+        </p:nvCxnSpPr>
+        <p:spPr>
+          <a:xfrm flipH="1">
+            <a:off x="2951855" y="3036232"/>
+            <a:ext cx="748702" cy="130409"/>
+          </a:xfrm>
+          <a:prstGeom prst="straightConnector1">
+            <a:avLst/>
+          </a:prstGeom>
           <a:ln>
-            <a:solidFill>
-              <a:schemeClr val="bg1">
-                <a:lumMod val="50000"/>
-              </a:schemeClr>
-            </a:solidFill>
+            <a:tailEnd type="triangle"/>
           </a:ln>
+        </p:spPr>
+        <p:style>
+          <a:lnRef idx="1">
+            <a:schemeClr val="accent2"/>
+          </a:lnRef>
+          <a:fillRef idx="0">
+            <a:schemeClr val="accent2"/>
+          </a:fillRef>
+          <a:effectRef idx="0">
+            <a:schemeClr val="accent2"/>
+          </a:effectRef>
+          <a:fontRef idx="minor">
+            <a:schemeClr val="tx1"/>
+          </a:fontRef>
+        </p:style>
+      </p:cxnSp>
+      <p:sp>
+        <p:nvSpPr>
+          <p:cNvPr id="35" name="Title 1">
+            <a:extLst>
+              <a:ext uri="{FF2B5EF4-FFF2-40B4-BE49-F238E27FC236}">
+                <a16:creationId xmlns:a16="http://schemas.microsoft.com/office/drawing/2014/main" id="{2AF6813F-8AA0-E42B-A6BE-7AA5E7E0BAA2}"/>
+              </a:ext>
+            </a:extLst>
+          </p:cNvPr>
+          <p:cNvSpPr txBox="1">
+            <a:spLocks/>
+          </p:cNvSpPr>
+          <p:nvPr/>
+        </p:nvSpPr>
+        <p:spPr>
+          <a:xfrm>
+            <a:off x="1731818" y="5937469"/>
+            <a:ext cx="8728364" cy="689279"/>
+          </a:xfrm>
+          <a:prstGeom prst="rect">
+            <a:avLst/>
+          </a:prstGeom>
+        </p:spPr>
+        <p:txBody>
+          <a:bodyPr vert="horz" lIns="91440" tIns="45720" rIns="91440" bIns="45720" rtlCol="0" anchor="b">
+            <a:normAutofit/>
+          </a:bodyPr>
+          <a:lstStyle>
+            <a:lvl1pPr algn="l" defTabSz="914400" rtl="0" eaLnBrk="1" latinLnBrk="0" hangingPunct="1">
+              <a:lnSpc>
+                <a:spcPct val="90000"/>
+              </a:lnSpc>
+              <a:spcBef>
+                <a:spcPct val="0"/>
+              </a:spcBef>
+              <a:buNone/>
+              <a:defRPr sz="3600" b="1" kern="1200">
+                <a:solidFill>
+                  <a:schemeClr val="tx1"/>
+                </a:solidFill>
+                <a:latin typeface="+mj-lt"/>
+                <a:ea typeface="+mj-ea"/>
+                <a:cs typeface="+mj-cs"/>
+              </a:defRPr>
+            </a:lvl1pPr>
+          </a:lstStyle>
+          <a:p>
+            <a:pPr algn="ctr"/>
+            <a:r>
+              <a:rPr lang="en-US" sz="2400" b="0" dirty="0">
+                <a:solidFill>
+                  <a:schemeClr val="bg1">
+                    <a:lumMod val="65000"/>
+                  </a:schemeClr>
+                </a:solidFill>
+              </a:rPr>
+              <a:t>*Fully Reactive*</a:t>
+            </a:r>
+          </a:p>
+        </p:txBody>
+      </p:sp>
+    </p:spTree>
+    <p:extLst>
+      <p:ext uri="{BB962C8B-B14F-4D97-AF65-F5344CB8AC3E}">
+        <p14:creationId xmlns:p14="http://schemas.microsoft.com/office/powerpoint/2010/main" val="3821736867"/>
+      </p:ext>
+    </p:extLst>
+  </p:cSld>
+  <p:clrMapOvr>
+    <a:masterClrMapping/>
+  </p:clrMapOvr>
+</p:sld>
+</file>
+
+<file path=ppt/slides/slide4.xml><?xml version="1.0" encoding="utf-8"?>
+<p:sld xmlns:a="http://schemas.openxmlformats.org/drawingml/2006/main" xmlns:r="http://schemas.openxmlformats.org/officeDocument/2006/relationships" xmlns:p="http://schemas.openxmlformats.org/presentationml/2006/main">
+  <p:cSld>
+    <p:bg>
+      <p:bgPr>
+        <a:solidFill>
+          <a:schemeClr val="bg1"/>
+        </a:solidFill>
+        <a:effectLst/>
+      </p:bgPr>
+    </p:bg>
+    <p:spTree>
+      <p:nvGrpSpPr>
+        <p:cNvPr id="1" name=""/>
+        <p:cNvGrpSpPr/>
+        <p:nvPr/>
+      </p:nvGrpSpPr>
+      <p:grpSpPr>
+        <a:xfrm>
+          <a:off x="0" y="0"/>
+          <a:ext cx="0" cy="0"/>
+          <a:chOff x="0" y="0"/>
+          <a:chExt cx="0" cy="0"/>
+        </a:xfrm>
+      </p:grpSpPr>
+      <p:sp useBgFill="1">
+        <p:nvSpPr>
+          <p:cNvPr id="10" name="Rectangle 9">
+            <a:extLst>
+              <a:ext uri="{FF2B5EF4-FFF2-40B4-BE49-F238E27FC236}">
+                <a16:creationId xmlns:a16="http://schemas.microsoft.com/office/drawing/2014/main" id="{2961259D-605E-E200-FF9F-7C8C71D7C8E4}"/>
+              </a:ext>
+              <a:ext uri="{C183D7F6-B498-43B3-948B-1728B52AA6E4}">
+                <adec:decorative xmlns:adec="http://schemas.microsoft.com/office/drawing/2017/decorative" val="1"/>
+              </a:ext>
+            </a:extLst>
+          </p:cNvPr>
+          <p:cNvSpPr>
+            <a:spLocks noGrp="1" noRot="1" noChangeAspect="1" noMove="1" noResize="1" noEditPoints="1" noAdjustHandles="1" noChangeArrowheads="1" noChangeShapeType="1" noTextEdit="1"/>
+          </p:cNvSpPr>
+          <p:nvPr>
+            <p:extLst>
+              <p:ext uri="{386F3935-93C4-4BCD-93E2-E3B085C9AB24}">
+                <p16:designElem xmlns:p16="http://schemas.microsoft.com/office/powerpoint/2015/main" val="1"/>
+              </p:ext>
+            </p:extLst>
+          </p:nvPr>
+        </p:nvSpPr>
+        <p:spPr>
+          <a:xfrm>
+            <a:off x="0" y="0"/>
+            <a:ext cx="12192000" cy="6858000"/>
+          </a:xfrm>
+          <a:prstGeom prst="rect">
+            <a:avLst/>
+          </a:prstGeom>
+          <a:ln w="12700" cap="flat" cmpd="sng" algn="ctr">
+            <a:noFill/>
+            <a:prstDash val="solid"/>
+            <a:miter lim="800000"/>
+          </a:ln>
+          <a:effectLst/>
+          <a:extLst>
+            <a:ext uri="{91240B29-F687-4F45-9708-019B960494DF}">
+              <a14:hiddenLine xmlns:a14="http://schemas.microsoft.com/office/drawing/2010/main" w="12700" cap="flat" cmpd="sng" algn="ctr">
+                <a:solidFill>
+                  <a:schemeClr val="accent1">
+                    <a:shade val="15000"/>
+                  </a:schemeClr>
+                </a:solidFill>
+                <a:prstDash val="solid"/>
+                <a:miter lim="800000"/>
+              </a14:hiddenLine>
+            </a:ext>
+          </a:extLst>
         </p:spPr>
         <p:style>
           <a:lnRef idx="2">
@@ -4755,7 +5447,7 @@
           <p:cNvPr id="2" name="Title 1">
             <a:extLst>
               <a:ext uri="{FF2B5EF4-FFF2-40B4-BE49-F238E27FC236}">
-                <a16:creationId xmlns:a16="http://schemas.microsoft.com/office/drawing/2014/main" id="{130A7FC6-ECB7-45C8-D205-0D07C57D242A}"/>
+                <a16:creationId xmlns:a16="http://schemas.microsoft.com/office/drawing/2014/main" id="{DE3C2B44-98EC-F444-BF05-99FBFCE49922}"/>
               </a:ext>
             </a:extLst>
           </p:cNvPr>
@@ -4768,8 +5460,8 @@
         </p:nvSpPr>
         <p:spPr>
           <a:xfrm>
-            <a:off x="1018116" y="651608"/>
-            <a:ext cx="3553412" cy="787238"/>
+            <a:off x="612648" y="600074"/>
+            <a:ext cx="6035040" cy="1529932"/>
           </a:xfrm>
         </p:spPr>
         <p:txBody>
@@ -4779,22 +5471,18 @@
           <a:lstStyle/>
           <a:p>
             <a:r>
-              <a:rPr lang="en-US" dirty="0">
-                <a:solidFill>
-                  <a:schemeClr val="bg1"/>
-                </a:solidFill>
-              </a:rPr>
-              <a:t>End Goal</a:t>
-            </a:r>
-          </a:p>
-        </p:txBody>
-      </p:sp>
-      <p:sp>
-        <p:nvSpPr>
-          <p:cNvPr id="17" name="Content Placeholder 2">
-            <a:extLst>
-              <a:ext uri="{FF2B5EF4-FFF2-40B4-BE49-F238E27FC236}">
-                <a16:creationId xmlns:a16="http://schemas.microsoft.com/office/drawing/2014/main" id="{04BB79EE-14F3-69B4-B75E-C452211DA388}"/>
+              <a:rPr lang="en-US" dirty="0"/>
+              <a:t>Dashboard App and Functionality – Deep Dive</a:t>
+            </a:r>
+          </a:p>
+        </p:txBody>
+      </p:sp>
+      <p:sp>
+        <p:nvSpPr>
+          <p:cNvPr id="3" name="Content Placeholder 2">
+            <a:extLst>
+              <a:ext uri="{FF2B5EF4-FFF2-40B4-BE49-F238E27FC236}">
+                <a16:creationId xmlns:a16="http://schemas.microsoft.com/office/drawing/2014/main" id="{14C7575C-6E28-1930-1BBC-8E1A53E9B3E1}"/>
               </a:ext>
             </a:extLst>
           </p:cNvPr>
@@ -4807,195 +5495,312 @@
         </p:nvSpPr>
         <p:spPr>
           <a:xfrm>
-            <a:off x="1246717" y="1648203"/>
-            <a:ext cx="9654646" cy="4122420"/>
+            <a:off x="612647" y="2212848"/>
+            <a:ext cx="6035041" cy="4096512"/>
           </a:xfrm>
         </p:spPr>
         <p:txBody>
           <a:bodyPr>
-            <a:normAutofit lnSpcReduction="10000"/>
+            <a:normAutofit fontScale="92500"/>
           </a:bodyPr>
           <a:lstStyle/>
           <a:p>
-            <a:pPr>
-              <a:lnSpc>
-                <a:spcPct val="110000"/>
-              </a:lnSpc>
-            </a:pPr>
+            <a:r>
+              <a:rPr lang="en-US" sz="1800" dirty="0"/>
+              <a:t>Full reactivity of user inputs </a:t>
+            </a:r>
+          </a:p>
+          <a:p>
+            <a:pPr lvl="1"/>
+            <a:r>
+              <a:rPr lang="en-US" dirty="0"/>
+              <a:t>Changing any of “Base”/ “Quote” country codes, date range, and/or forecasting</a:t>
+            </a:r>
+          </a:p>
+          <a:p>
+            <a:pPr lvl="1"/>
+            <a:endParaRPr lang="en-US" dirty="0"/>
+          </a:p>
+          <a:p>
+            <a:r>
+              <a:rPr lang="en-US" sz="1800" dirty="0"/>
+              <a:t>Cautious not to overwhelm server with user inputs </a:t>
+            </a:r>
             <a:r>
               <a:rPr lang="en-US" sz="1800" dirty="0">
-                <a:solidFill>
-                  <a:schemeClr val="bg1"/>
-                </a:solidFill>
+                <a:sym typeface="Wingdings" panose="05000000000000000000" pitchFamily="2" charset="2"/>
               </a:rPr>
-              <a:t>Python Shiny Dashboard</a:t>
-            </a:r>
-          </a:p>
-          <a:p>
-            <a:pPr lvl="1">
-              <a:lnSpc>
-                <a:spcPct val="110000"/>
-              </a:lnSpc>
-            </a:pPr>
+              <a:t> infinite loop/flip flopping values</a:t>
+            </a:r>
+          </a:p>
+          <a:p>
+            <a:pPr lvl="1"/>
+            <a:r>
+              <a:rPr lang="en-US" dirty="0" err="1">
+                <a:sym typeface="Wingdings" panose="05000000000000000000" pitchFamily="2" charset="2"/>
+              </a:rPr>
+              <a:t>Time.sleep</a:t>
+            </a:r>
             <a:r>
               <a:rPr lang="en-US" dirty="0">
-                <a:solidFill>
-                  <a:schemeClr val="bg1"/>
-                </a:solidFill>
+                <a:sym typeface="Wingdings" panose="05000000000000000000" pitchFamily="2" charset="2"/>
               </a:rPr>
-              <a:t>Providing “Graphics and Predictive Modelling Services for Investors and Consumers”</a:t>
-            </a:r>
-          </a:p>
-          <a:p>
-            <a:pPr>
-              <a:lnSpc>
-                <a:spcPct val="110000"/>
-              </a:lnSpc>
-            </a:pPr>
+              <a:t>(.2)</a:t>
+            </a:r>
+          </a:p>
+          <a:p>
+            <a:pPr lvl="1"/>
+            <a:r>
+              <a:rPr lang="en-US" dirty="0">
+                <a:sym typeface="Wingdings" panose="05000000000000000000" pitchFamily="2" charset="2"/>
+              </a:rPr>
+              <a:t>Re-</a:t>
+            </a:r>
+            <a:r>
+              <a:rPr lang="en-US" dirty="0" err="1">
+                <a:sym typeface="Wingdings" panose="05000000000000000000" pitchFamily="2" charset="2"/>
+              </a:rPr>
+              <a:t>entrancy</a:t>
+            </a:r>
+            <a:r>
+              <a:rPr lang="en-US" dirty="0">
+                <a:sym typeface="Wingdings" panose="05000000000000000000" pitchFamily="2" charset="2"/>
+              </a:rPr>
+              <a:t> Guards</a:t>
+            </a:r>
+          </a:p>
+          <a:p>
+            <a:pPr lvl="1"/>
+            <a:r>
+              <a:rPr lang="en-US" dirty="0">
+                <a:sym typeface="Wingdings" panose="05000000000000000000" pitchFamily="2" charset="2"/>
+              </a:rPr>
+              <a:t>Catching calculation error induced by delayed display</a:t>
+            </a:r>
+          </a:p>
+          <a:p>
+            <a:pPr lvl="2"/>
+            <a:r>
+              <a:rPr lang="en-US" sz="1800" dirty="0">
+                <a:sym typeface="Wingdings" panose="05000000000000000000" pitchFamily="2" charset="2"/>
+              </a:rPr>
+              <a:t>Without these guards Base and Quote country amounts would balloon to infinity. </a:t>
+            </a:r>
+          </a:p>
+          <a:p>
+            <a:pPr lvl="2"/>
             <a:endParaRPr lang="en-US" sz="1800" dirty="0">
-              <a:solidFill>
-                <a:schemeClr val="bg1"/>
-              </a:solidFill>
+              <a:sym typeface="Wingdings" panose="05000000000000000000" pitchFamily="2" charset="2"/>
             </a:endParaRPr>
           </a:p>
           <a:p>
-            <a:pPr>
-              <a:lnSpc>
-                <a:spcPct val="110000"/>
-              </a:lnSpc>
-            </a:pPr>
-            <a:r>
-              <a:rPr lang="en-US" sz="1800" dirty="0">
-                <a:solidFill>
-                  <a:schemeClr val="bg1"/>
-                </a:solidFill>
-              </a:rPr>
-              <a:t>Graphics and Predictive Modelling Services:</a:t>
-            </a:r>
-          </a:p>
-          <a:p>
-            <a:pPr lvl="1">
-              <a:lnSpc>
-                <a:spcPct val="110000"/>
-              </a:lnSpc>
-            </a:pPr>
-            <a:r>
-              <a:rPr lang="en-US" dirty="0">
-                <a:solidFill>
-                  <a:schemeClr val="bg1"/>
-                </a:solidFill>
-              </a:rPr>
-              <a:t>Simple </a:t>
-            </a:r>
-            <a:r>
-              <a:rPr lang="en-US" dirty="0" err="1">
-                <a:solidFill>
-                  <a:schemeClr val="bg1"/>
-                </a:solidFill>
-              </a:rPr>
-              <a:t>ExRate</a:t>
-            </a:r>
-            <a:r>
-              <a:rPr lang="en-US" dirty="0">
-                <a:solidFill>
-                  <a:schemeClr val="bg1"/>
-                </a:solidFill>
-              </a:rPr>
-              <a:t> Graphics (seen in past slide) </a:t>
-            </a:r>
-          </a:p>
-          <a:p>
-            <a:pPr lvl="1">
-              <a:lnSpc>
-                <a:spcPct val="110000"/>
-              </a:lnSpc>
-            </a:pPr>
-            <a:r>
-              <a:rPr lang="en-US" dirty="0">
-                <a:solidFill>
-                  <a:schemeClr val="bg1"/>
-                </a:solidFill>
-              </a:rPr>
-              <a:t>Currency Trend Predictor (ML Solution, likely LSTM)</a:t>
-            </a:r>
-          </a:p>
-          <a:p>
-            <a:pPr lvl="1">
-              <a:lnSpc>
-                <a:spcPct val="110000"/>
-              </a:lnSpc>
-            </a:pPr>
-            <a:r>
-              <a:rPr lang="en-US" dirty="0">
-                <a:solidFill>
-                  <a:schemeClr val="bg1"/>
-                </a:solidFill>
-              </a:rPr>
-              <a:t>Travel Planner (Cheapest time for Travel, e.g. Europe 2022/Japan 2024)</a:t>
-            </a:r>
-          </a:p>
-          <a:p>
-            <a:pPr lvl="1">
-              <a:lnSpc>
-                <a:spcPct val="110000"/>
-              </a:lnSpc>
-            </a:pPr>
-            <a:r>
-              <a:rPr lang="en-US" dirty="0">
-                <a:solidFill>
-                  <a:schemeClr val="bg1"/>
-                </a:solidFill>
-              </a:rPr>
-              <a:t>*Maybe* Carry Trade Screener</a:t>
-            </a:r>
-          </a:p>
-          <a:p>
-            <a:pPr marL="228600" lvl="1" indent="0">
-              <a:lnSpc>
-                <a:spcPct val="110000"/>
-              </a:lnSpc>
-              <a:buNone/>
-            </a:pPr>
+            <a:pPr lvl="1"/>
             <a:endParaRPr lang="en-US" dirty="0">
-              <a:solidFill>
-                <a:schemeClr val="bg1"/>
-              </a:solidFill>
+              <a:sym typeface="Wingdings" panose="05000000000000000000" pitchFamily="2" charset="2"/>
             </a:endParaRPr>
           </a:p>
           <a:p>
-            <a:pPr marL="228600" lvl="1" indent="0">
-              <a:lnSpc>
-                <a:spcPct val="110000"/>
-              </a:lnSpc>
-              <a:buNone/>
-            </a:pPr>
-            <a:endParaRPr lang="en-US" dirty="0">
-              <a:solidFill>
-                <a:schemeClr val="bg1"/>
-              </a:solidFill>
-            </a:endParaRPr>
-          </a:p>
-          <a:p>
-            <a:pPr>
-              <a:lnSpc>
-                <a:spcPct val="110000"/>
-              </a:lnSpc>
-            </a:pPr>
-            <a:r>
-              <a:rPr lang="en-US" sz="1800" dirty="0">
-                <a:solidFill>
-                  <a:schemeClr val="bg1"/>
-                </a:solidFill>
-              </a:rPr>
-              <a:t>(Might be biting off more than I can chew)</a:t>
-            </a:r>
-          </a:p>
-        </p:txBody>
-      </p:sp>
+            <a:pPr lvl="1"/>
+            <a:endParaRPr lang="en-US" dirty="0"/>
+          </a:p>
+        </p:txBody>
+      </p:sp>
+      <p:pic>
+        <p:nvPicPr>
+          <p:cNvPr id="5" name="Picture 4">
+            <a:extLst>
+              <a:ext uri="{FF2B5EF4-FFF2-40B4-BE49-F238E27FC236}">
+                <a16:creationId xmlns:a16="http://schemas.microsoft.com/office/drawing/2014/main" id="{DD396B86-BE67-C2C9-6658-57BE2F3C521D}"/>
+              </a:ext>
+            </a:extLst>
+          </p:cNvPr>
+          <p:cNvPicPr>
+            <a:picLocks noChangeAspect="1"/>
+          </p:cNvPicPr>
+          <p:nvPr/>
+        </p:nvPicPr>
+        <p:blipFill>
+          <a:blip r:embed="rId2"/>
+          <a:srcRect r="19238"/>
+          <a:stretch>
+            <a:fillRect/>
+          </a:stretch>
+        </p:blipFill>
+        <p:spPr>
+          <a:xfrm>
+            <a:off x="7345680" y="10"/>
+            <a:ext cx="4846320" cy="6857990"/>
+          </a:xfrm>
+          <a:prstGeom prst="rect">
+            <a:avLst/>
+          </a:prstGeom>
+        </p:spPr>
+      </p:pic>
     </p:spTree>
     <p:extLst>
       <p:ext uri="{BB962C8B-B14F-4D97-AF65-F5344CB8AC3E}">
-        <p14:creationId xmlns:p14="http://schemas.microsoft.com/office/powerpoint/2010/main" val="810591715"/>
+        <p14:creationId xmlns:p14="http://schemas.microsoft.com/office/powerpoint/2010/main" val="1096804238"/>
+      </p:ext>
+    </p:extLst>
+  </p:cSld>
+  <p:clrMapOvr>
+    <a:masterClrMapping/>
+  </p:clrMapOvr>
+</p:sld>
+</file>
+
+<file path=ppt/slides/slide5.xml><?xml version="1.0" encoding="utf-8"?>
+<p:sld xmlns:a="http://schemas.openxmlformats.org/drawingml/2006/main" xmlns:r="http://schemas.openxmlformats.org/officeDocument/2006/relationships" xmlns:p="http://schemas.openxmlformats.org/presentationml/2006/main">
+  <p:cSld>
+    <p:spTree>
+      <p:nvGrpSpPr>
+        <p:cNvPr id="1" name=""/>
+        <p:cNvGrpSpPr/>
+        <p:nvPr/>
+      </p:nvGrpSpPr>
+      <p:grpSpPr>
+        <a:xfrm>
+          <a:off x="0" y="0"/>
+          <a:ext cx="0" cy="0"/>
+          <a:chOff x="0" y="0"/>
+          <a:chExt cx="0" cy="0"/>
+        </a:xfrm>
+      </p:grpSpPr>
+      <p:sp>
+        <p:nvSpPr>
+          <p:cNvPr id="2" name="Title 1">
+            <a:extLst>
+              <a:ext uri="{FF2B5EF4-FFF2-40B4-BE49-F238E27FC236}">
+                <a16:creationId xmlns:a16="http://schemas.microsoft.com/office/drawing/2014/main" id="{9662517C-C55B-B654-689F-E625BED33AB0}"/>
+              </a:ext>
+            </a:extLst>
+          </p:cNvPr>
+          <p:cNvSpPr>
+            <a:spLocks noGrp="1"/>
+          </p:cNvSpPr>
+          <p:nvPr>
+            <p:ph type="title"/>
+          </p:nvPr>
+        </p:nvSpPr>
+        <p:spPr/>
+        <p:txBody>
+          <a:bodyPr/>
+          <a:lstStyle/>
+          <a:p>
+            <a:r>
+              <a:rPr lang="en-US" dirty="0"/>
+              <a:t>Concluding Remarks</a:t>
+            </a:r>
+          </a:p>
+        </p:txBody>
+      </p:sp>
+      <p:sp>
+        <p:nvSpPr>
+          <p:cNvPr id="3" name="Content Placeholder 2">
+            <a:extLst>
+              <a:ext uri="{FF2B5EF4-FFF2-40B4-BE49-F238E27FC236}">
+                <a16:creationId xmlns:a16="http://schemas.microsoft.com/office/drawing/2014/main" id="{50E9E1BB-71A8-725A-7363-8FF19A555CB3}"/>
+              </a:ext>
+            </a:extLst>
+          </p:cNvPr>
+          <p:cNvSpPr>
+            <a:spLocks noGrp="1"/>
+          </p:cNvSpPr>
+          <p:nvPr>
+            <p:ph idx="1"/>
+          </p:nvPr>
+        </p:nvSpPr>
+        <p:spPr/>
+        <p:txBody>
+          <a:bodyPr/>
+          <a:lstStyle/>
+          <a:p>
+            <a:r>
+              <a:rPr lang="en-US" dirty="0"/>
+              <a:t>Given project deadline focused on functional output</a:t>
+            </a:r>
+          </a:p>
+          <a:p>
+            <a:pPr lvl="1"/>
+            <a:r>
+              <a:rPr lang="en-US" dirty="0"/>
+              <a:t>After quarter end, can focus on expanding functionality and making it </a:t>
+            </a:r>
+            <a:r>
+              <a:rPr lang="en-US" i="1" dirty="0">
+                <a:solidFill>
+                  <a:srgbClr val="FF33CC"/>
+                </a:solidFill>
+              </a:rPr>
+              <a:t>*pretty*</a:t>
+            </a:r>
+            <a:endParaRPr lang="en-US" dirty="0">
+              <a:solidFill>
+                <a:srgbClr val="FF33CC"/>
+              </a:solidFill>
+            </a:endParaRPr>
+          </a:p>
+          <a:p>
+            <a:pPr lvl="1"/>
+            <a:endParaRPr lang="en-US" dirty="0"/>
+          </a:p>
+          <a:p>
+            <a:r>
+              <a:rPr lang="en-US" dirty="0"/>
+              <a:t>Backend model integration was easier than I thought</a:t>
+            </a:r>
+          </a:p>
+          <a:p>
+            <a:pPr lvl="1"/>
+            <a:r>
+              <a:rPr lang="en-US" dirty="0"/>
+              <a:t>Initial hesitations and concerns working with Flask</a:t>
+            </a:r>
+          </a:p>
+          <a:p>
+            <a:pPr lvl="1"/>
+            <a:r>
+              <a:rPr lang="en-US" dirty="0"/>
+              <a:t>In future iterations of similar projects, would need to cache output of more complex algorithms</a:t>
+            </a:r>
+          </a:p>
+          <a:p>
+            <a:pPr lvl="2"/>
+            <a:r>
+              <a:rPr lang="en-US" dirty="0"/>
+              <a:t>LSTM w/ multiple epochs begins to require multiple hours of training time</a:t>
+            </a:r>
+          </a:p>
+          <a:p>
+            <a:pPr lvl="2"/>
+            <a:endParaRPr lang="en-US" dirty="0"/>
+          </a:p>
+          <a:p>
+            <a:r>
+              <a:rPr lang="en-US" dirty="0"/>
+              <a:t>VS Code w/ Copilot Integration</a:t>
+            </a:r>
+          </a:p>
+          <a:p>
+            <a:pPr lvl="1"/>
+            <a:r>
+              <a:rPr lang="en-US" dirty="0"/>
+              <a:t>Extremely convenient but distracting</a:t>
+            </a:r>
+          </a:p>
+          <a:p>
+            <a:pPr lvl="1"/>
+            <a:r>
+              <a:rPr lang="en-US" dirty="0"/>
+              <a:t>No longer felt like coding</a:t>
+            </a:r>
+          </a:p>
+        </p:txBody>
+      </p:sp>
+    </p:spTree>
+    <p:extLst>
+      <p:ext uri="{BB962C8B-B14F-4D97-AF65-F5344CB8AC3E}">
+        <p14:creationId xmlns:p14="http://schemas.microsoft.com/office/powerpoint/2010/main" val="2585216105"/>
       </p:ext>
     </p:extLst>
   </p:cSld>

</xml_diff>